<commit_message>
added prensentation for provider
</commit_message>
<xml_diff>
--- a/Modul_02_Provider/Provider.pptx
+++ b/Modul_02_Provider/Provider.pptx
@@ -5,10 +5,14 @@
     <p:sldMasterId id="2147483648" r:id="rId1"/>
   </p:sldMasterIdLst>
   <p:notesMasterIdLst>
-    <p:notesMasterId r:id="rId3"/>
+    <p:notesMasterId r:id="rId7"/>
   </p:notesMasterIdLst>
   <p:sldIdLst>
-    <p:sldId id="257" r:id="rId2"/>
+    <p:sldId id="258" r:id="rId2"/>
+    <p:sldId id="257" r:id="rId3"/>
+    <p:sldId id="259" r:id="rId4"/>
+    <p:sldId id="261" r:id="rId5"/>
+    <p:sldId id="260" r:id="rId6"/>
   </p:sldIdLst>
   <p:sldSz cx="12192000" cy="6858000"/>
   <p:notesSz cx="6858000" cy="9144000"/>
@@ -197,7 +201,7 @@
           <a:p>
             <a:fld id="{E9DAB8B5-B9A3-426D-91D9-D7966B0F2B79}" type="datetimeFigureOut">
               <a:rPr lang="de-DE" smtClean="0"/>
-              <a:t>14.11.2021</a:t>
+              <a:t>20.11.2021</a:t>
             </a:fld>
             <a:endParaRPr lang="de-DE"/>
           </a:p>
@@ -539,7 +543,200 @@
     </p:spTree>
     <p:extLst>
       <p:ext uri="{BB962C8B-B14F-4D97-AF65-F5344CB8AC3E}">
+        <p14:creationId xmlns:p14="http://schemas.microsoft.com/office/powerpoint/2010/main" val="3018794461"/>
+      </p:ext>
+    </p:extLst>
+  </p:cSld>
+  <p:clrMapOvr>
+    <a:masterClrMapping/>
+  </p:clrMapOvr>
+</p:notes>
+</file>
+
+<file path=ppt/notesSlides/notesSlide2.xml><?xml version="1.0" encoding="utf-8"?>
+<p:notes xmlns:a="http://schemas.openxmlformats.org/drawingml/2006/main" xmlns:r="http://schemas.openxmlformats.org/officeDocument/2006/relationships" xmlns:p="http://schemas.openxmlformats.org/presentationml/2006/main">
+  <p:cSld>
+    <p:spTree>
+      <p:nvGrpSpPr>
+        <p:cNvPr id="1" name=""/>
+        <p:cNvGrpSpPr/>
+        <p:nvPr/>
+      </p:nvGrpSpPr>
+      <p:grpSpPr>
+        <a:xfrm>
+          <a:off x="0" y="0"/>
+          <a:ext cx="0" cy="0"/>
+          <a:chOff x="0" y="0"/>
+          <a:chExt cx="0" cy="0"/>
+        </a:xfrm>
+      </p:grpSpPr>
+      <p:sp>
+        <p:nvSpPr>
+          <p:cNvPr id="2" name="Folienbildplatzhalter 1"/>
+          <p:cNvSpPr>
+            <a:spLocks noGrp="1" noRot="1" noChangeAspect="1"/>
+          </p:cNvSpPr>
+          <p:nvPr>
+            <p:ph type="sldImg"/>
+          </p:nvPr>
+        </p:nvSpPr>
+        <p:spPr/>
+      </p:sp>
+      <p:sp>
+        <p:nvSpPr>
+          <p:cNvPr id="3" name="Notizenplatzhalter 2"/>
+          <p:cNvSpPr>
+            <a:spLocks noGrp="1"/>
+          </p:cNvSpPr>
+          <p:nvPr>
+            <p:ph type="body" idx="1"/>
+          </p:nvPr>
+        </p:nvSpPr>
+        <p:spPr/>
+        <p:txBody>
+          <a:bodyPr/>
+          <a:lstStyle/>
+          <a:p>
+            <a:r>
+              <a:rPr lang="de-DE" dirty="0" smtClean="0"/>
+              <a:t>Ca. 200 offizielle und verifizierte </a:t>
+            </a:r>
+            <a:r>
+              <a:rPr lang="de-DE" dirty="0" err="1" smtClean="0"/>
+              <a:t>Provier</a:t>
+            </a:r>
+            <a:endParaRPr lang="de-DE" dirty="0" smtClean="0"/>
+          </a:p>
+          <a:p>
+            <a:r>
+              <a:rPr lang="de-DE" dirty="0" smtClean="0"/>
+              <a:t>&gt;1400 Community-Provider</a:t>
+            </a:r>
+          </a:p>
+          <a:p>
+            <a:endParaRPr lang="de-DE" dirty="0"/>
+          </a:p>
+        </p:txBody>
+      </p:sp>
+      <p:sp>
+        <p:nvSpPr>
+          <p:cNvPr id="4" name="Foliennummernplatzhalter 3"/>
+          <p:cNvSpPr>
+            <a:spLocks noGrp="1"/>
+          </p:cNvSpPr>
+          <p:nvPr>
+            <p:ph type="sldNum" sz="quarter" idx="10"/>
+          </p:nvPr>
+        </p:nvSpPr>
+        <p:spPr/>
+        <p:txBody>
+          <a:bodyPr/>
+          <a:lstStyle/>
+          <a:p>
+            <a:fld id="{E58C7EAB-645A-4FBB-B6AF-831236EEB6FB}" type="slidenum">
+              <a:rPr lang="de-DE" smtClean="0"/>
+              <a:t>2</a:t>
+            </a:fld>
+            <a:endParaRPr lang="de-DE"/>
+          </a:p>
+        </p:txBody>
+      </p:sp>
+    </p:spTree>
+    <p:extLst>
+      <p:ext uri="{BB962C8B-B14F-4D97-AF65-F5344CB8AC3E}">
         <p14:creationId xmlns:p14="http://schemas.microsoft.com/office/powerpoint/2010/main" val="680033503"/>
+      </p:ext>
+    </p:extLst>
+  </p:cSld>
+  <p:clrMapOvr>
+    <a:masterClrMapping/>
+  </p:clrMapOvr>
+</p:notes>
+</file>
+
+<file path=ppt/notesSlides/notesSlide3.xml><?xml version="1.0" encoding="utf-8"?>
+<p:notes xmlns:a="http://schemas.openxmlformats.org/drawingml/2006/main" xmlns:r="http://schemas.openxmlformats.org/officeDocument/2006/relationships" xmlns:p="http://schemas.openxmlformats.org/presentationml/2006/main">
+  <p:cSld>
+    <p:spTree>
+      <p:nvGrpSpPr>
+        <p:cNvPr id="1" name=""/>
+        <p:cNvGrpSpPr/>
+        <p:nvPr/>
+      </p:nvGrpSpPr>
+      <p:grpSpPr>
+        <a:xfrm>
+          <a:off x="0" y="0"/>
+          <a:ext cx="0" cy="0"/>
+          <a:chOff x="0" y="0"/>
+          <a:chExt cx="0" cy="0"/>
+        </a:xfrm>
+      </p:grpSpPr>
+      <p:sp>
+        <p:nvSpPr>
+          <p:cNvPr id="2" name="Folienbildplatzhalter 1"/>
+          <p:cNvSpPr>
+            <a:spLocks noGrp="1" noRot="1" noChangeAspect="1"/>
+          </p:cNvSpPr>
+          <p:nvPr>
+            <p:ph type="sldImg"/>
+          </p:nvPr>
+        </p:nvSpPr>
+        <p:spPr/>
+      </p:sp>
+      <p:sp>
+        <p:nvSpPr>
+          <p:cNvPr id="3" name="Notizenplatzhalter 2"/>
+          <p:cNvSpPr>
+            <a:spLocks noGrp="1"/>
+          </p:cNvSpPr>
+          <p:nvPr>
+            <p:ph type="body" idx="1"/>
+          </p:nvPr>
+        </p:nvSpPr>
+        <p:spPr/>
+        <p:txBody>
+          <a:bodyPr/>
+          <a:lstStyle/>
+          <a:p>
+            <a:r>
+              <a:rPr lang="de-DE" dirty="0" smtClean="0"/>
+              <a:t>Terraform Block enthält die Terraform Konfiguration, wie</a:t>
+            </a:r>
+            <a:r>
+              <a:rPr lang="de-DE" baseline="0" dirty="0" smtClean="0"/>
+              <a:t> z.B. die Aktivierung von experimentellen Features</a:t>
+            </a:r>
+            <a:endParaRPr lang="de-DE" dirty="0"/>
+          </a:p>
+        </p:txBody>
+      </p:sp>
+      <p:sp>
+        <p:nvSpPr>
+          <p:cNvPr id="4" name="Foliennummernplatzhalter 3"/>
+          <p:cNvSpPr>
+            <a:spLocks noGrp="1"/>
+          </p:cNvSpPr>
+          <p:nvPr>
+            <p:ph type="sldNum" sz="quarter" idx="10"/>
+          </p:nvPr>
+        </p:nvSpPr>
+        <p:spPr/>
+        <p:txBody>
+          <a:bodyPr/>
+          <a:lstStyle/>
+          <a:p>
+            <a:fld id="{E58C7EAB-645A-4FBB-B6AF-831236EEB6FB}" type="slidenum">
+              <a:rPr lang="de-DE" smtClean="0"/>
+              <a:t>4</a:t>
+            </a:fld>
+            <a:endParaRPr lang="de-DE"/>
+          </a:p>
+        </p:txBody>
+      </p:sp>
+    </p:spTree>
+    <p:extLst>
+      <p:ext uri="{BB962C8B-B14F-4D97-AF65-F5344CB8AC3E}">
+        <p14:creationId xmlns:p14="http://schemas.microsoft.com/office/powerpoint/2010/main" val="1795237907"/>
       </p:ext>
     </p:extLst>
   </p:cSld>
@@ -680,7 +877,7 @@
           <a:p>
             <a:fld id="{6CBA03CC-73C5-46A8-8DFB-B5DC4577D8E2}" type="datetimeFigureOut">
               <a:rPr lang="de-DE" smtClean="0"/>
-              <a:t>14.11.2021</a:t>
+              <a:t>20.11.2021</a:t>
             </a:fld>
             <a:endParaRPr lang="de-DE"/>
           </a:p>
@@ -850,7 +1047,7 @@
           <a:p>
             <a:fld id="{6CBA03CC-73C5-46A8-8DFB-B5DC4577D8E2}" type="datetimeFigureOut">
               <a:rPr lang="de-DE" smtClean="0"/>
-              <a:t>14.11.2021</a:t>
+              <a:t>20.11.2021</a:t>
             </a:fld>
             <a:endParaRPr lang="de-DE"/>
           </a:p>
@@ -1030,7 +1227,7 @@
           <a:p>
             <a:fld id="{6CBA03CC-73C5-46A8-8DFB-B5DC4577D8E2}" type="datetimeFigureOut">
               <a:rPr lang="de-DE" smtClean="0"/>
-              <a:t>14.11.2021</a:t>
+              <a:t>20.11.2021</a:t>
             </a:fld>
             <a:endParaRPr lang="de-DE"/>
           </a:p>
@@ -1200,7 +1397,7 @@
           <a:p>
             <a:fld id="{6CBA03CC-73C5-46A8-8DFB-B5DC4577D8E2}" type="datetimeFigureOut">
               <a:rPr lang="de-DE" smtClean="0"/>
-              <a:t>14.11.2021</a:t>
+              <a:t>20.11.2021</a:t>
             </a:fld>
             <a:endParaRPr lang="de-DE"/>
           </a:p>
@@ -1446,7 +1643,7 @@
           <a:p>
             <a:fld id="{6CBA03CC-73C5-46A8-8DFB-B5DC4577D8E2}" type="datetimeFigureOut">
               <a:rPr lang="de-DE" smtClean="0"/>
-              <a:t>14.11.2021</a:t>
+              <a:t>20.11.2021</a:t>
             </a:fld>
             <a:endParaRPr lang="de-DE"/>
           </a:p>
@@ -1678,7 +1875,7 @@
           <a:p>
             <a:fld id="{6CBA03CC-73C5-46A8-8DFB-B5DC4577D8E2}" type="datetimeFigureOut">
               <a:rPr lang="de-DE" smtClean="0"/>
-              <a:t>14.11.2021</a:t>
+              <a:t>20.11.2021</a:t>
             </a:fld>
             <a:endParaRPr lang="de-DE"/>
           </a:p>
@@ -2045,7 +2242,7 @@
           <a:p>
             <a:fld id="{6CBA03CC-73C5-46A8-8DFB-B5DC4577D8E2}" type="datetimeFigureOut">
               <a:rPr lang="de-DE" smtClean="0"/>
-              <a:t>14.11.2021</a:t>
+              <a:t>20.11.2021</a:t>
             </a:fld>
             <a:endParaRPr lang="de-DE"/>
           </a:p>
@@ -2163,7 +2360,7 @@
           <a:p>
             <a:fld id="{6CBA03CC-73C5-46A8-8DFB-B5DC4577D8E2}" type="datetimeFigureOut">
               <a:rPr lang="de-DE" smtClean="0"/>
-              <a:t>14.11.2021</a:t>
+              <a:t>20.11.2021</a:t>
             </a:fld>
             <a:endParaRPr lang="de-DE"/>
           </a:p>
@@ -2258,7 +2455,7 @@
           <a:p>
             <a:fld id="{6CBA03CC-73C5-46A8-8DFB-B5DC4577D8E2}" type="datetimeFigureOut">
               <a:rPr lang="de-DE" smtClean="0"/>
-              <a:t>14.11.2021</a:t>
+              <a:t>20.11.2021</a:t>
             </a:fld>
             <a:endParaRPr lang="de-DE"/>
           </a:p>
@@ -2535,7 +2732,7 @@
           <a:p>
             <a:fld id="{6CBA03CC-73C5-46A8-8DFB-B5DC4577D8E2}" type="datetimeFigureOut">
               <a:rPr lang="de-DE" smtClean="0"/>
-              <a:t>14.11.2021</a:t>
+              <a:t>20.11.2021</a:t>
             </a:fld>
             <a:endParaRPr lang="de-DE"/>
           </a:p>
@@ -2788,7 +2985,7 @@
           <a:p>
             <a:fld id="{6CBA03CC-73C5-46A8-8DFB-B5DC4577D8E2}" type="datetimeFigureOut">
               <a:rPr lang="de-DE" smtClean="0"/>
-              <a:t>14.11.2021</a:t>
+              <a:t>20.11.2021</a:t>
             </a:fld>
             <a:endParaRPr lang="de-DE"/>
           </a:p>
@@ -3001,7 +3198,7 @@
           <a:p>
             <a:fld id="{6CBA03CC-73C5-46A8-8DFB-B5DC4577D8E2}" type="datetimeFigureOut">
               <a:rPr lang="de-DE" smtClean="0"/>
-              <a:t>14.11.2021</a:t>
+              <a:t>20.11.2021</a:t>
             </a:fld>
             <a:endParaRPr lang="de-DE"/>
           </a:p>
@@ -3441,21 +3638,157 @@
         </p:nvSpPr>
         <p:spPr>
           <a:xfrm>
-            <a:off x="838200" y="1825625"/>
-            <a:ext cx="10515600" cy="4351338"/>
+            <a:off x="838198" y="1825625"/>
+            <a:ext cx="10837335" cy="4351338"/>
           </a:xfrm>
         </p:spPr>
         <p:txBody>
           <a:bodyPr/>
           <a:lstStyle/>
           <a:p>
-            <a:pPr marL="0" indent="0">
-              <a:buNone/>
-            </a:pPr>
+            <a:r>
+              <a:rPr lang="de-DE" dirty="0" smtClean="0"/>
+              <a:t>Terraform benötigt API </a:t>
+            </a:r>
+            <a:r>
+              <a:rPr lang="de-DE" dirty="0" smtClean="0"/>
+              <a:t>zur Verwaltung von </a:t>
+            </a:r>
+            <a:r>
+              <a:rPr lang="de-DE" dirty="0" smtClean="0"/>
+              <a:t>Ressourcen</a:t>
+            </a:r>
+          </a:p>
+          <a:p>
+            <a:r>
+              <a:rPr lang="de-DE" dirty="0" smtClean="0"/>
+              <a:t>Terraform verwendet „Provider“ genannte </a:t>
+            </a:r>
+            <a:r>
+              <a:rPr lang="de-DE" dirty="0" err="1" smtClean="0"/>
+              <a:t>Plugins</a:t>
+            </a:r>
+            <a:r>
+              <a:rPr lang="de-DE" dirty="0" smtClean="0"/>
+              <a:t> um mit Cloud-Anbietern, SaaS-Providern und anderen APIs zu interagieren</a:t>
+            </a:r>
+          </a:p>
+          <a:p>
+            <a:r>
+              <a:rPr lang="de-DE" dirty="0" smtClean="0"/>
+              <a:t>Jeder Provider bietet eine Menge von Ressource-Typen und/oder Data </a:t>
+            </a:r>
+            <a:r>
+              <a:rPr lang="de-DE" dirty="0" err="1" smtClean="0"/>
+              <a:t>Sources</a:t>
+            </a:r>
             <a:endParaRPr lang="de-DE" dirty="0" smtClean="0"/>
           </a:p>
-        </p:txBody>
-      </p:sp>
+          <a:p>
+            <a:r>
+              <a:rPr lang="de-DE" dirty="0" err="1" smtClean="0"/>
+              <a:t>Versionierung</a:t>
+            </a:r>
+            <a:r>
+              <a:rPr lang="de-DE" dirty="0" smtClean="0"/>
+              <a:t> der einzelnen Provider ist unabhängig von der Terraform Version</a:t>
+            </a:r>
+          </a:p>
+          <a:p>
+            <a:r>
+              <a:rPr lang="de-DE" dirty="0" smtClean="0"/>
+              <a:t>Eine Terraform Konfiguration kann eine beliebige Anzahl von Providern verwenden</a:t>
+            </a:r>
+          </a:p>
+          <a:p>
+            <a:endParaRPr lang="de-DE" dirty="0" smtClean="0"/>
+          </a:p>
+        </p:txBody>
+      </p:sp>
+    </p:spTree>
+    <p:extLst>
+      <p:ext uri="{BB962C8B-B14F-4D97-AF65-F5344CB8AC3E}">
+        <p14:creationId xmlns:p14="http://schemas.microsoft.com/office/powerpoint/2010/main" val="2069122899"/>
+      </p:ext>
+    </p:extLst>
+  </p:cSld>
+  <p:clrMapOvr>
+    <a:masterClrMapping/>
+  </p:clrMapOvr>
+  <p:timing>
+    <p:tnLst>
+      <p:par>
+        <p:cTn id="1" dur="indefinite" restart="never" nodeType="tmRoot"/>
+      </p:par>
+    </p:tnLst>
+  </p:timing>
+</p:sld>
+</file>
+
+<file path=ppt/slides/slide2.xml><?xml version="1.0" encoding="utf-8"?>
+<p:sld xmlns:a="http://schemas.openxmlformats.org/drawingml/2006/main" xmlns:r="http://schemas.openxmlformats.org/officeDocument/2006/relationships" xmlns:p="http://schemas.openxmlformats.org/presentationml/2006/main">
+  <p:cSld>
+    <p:spTree>
+      <p:nvGrpSpPr>
+        <p:cNvPr id="1" name=""/>
+        <p:cNvGrpSpPr/>
+        <p:nvPr/>
+      </p:nvGrpSpPr>
+      <p:grpSpPr>
+        <a:xfrm>
+          <a:off x="0" y="0"/>
+          <a:ext cx="0" cy="0"/>
+          <a:chOff x="0" y="0"/>
+          <a:chExt cx="0" cy="0"/>
+        </a:xfrm>
+      </p:grpSpPr>
+      <p:sp>
+        <p:nvSpPr>
+          <p:cNvPr id="2" name="Titel 1"/>
+          <p:cNvSpPr>
+            <a:spLocks noGrp="1"/>
+          </p:cNvSpPr>
+          <p:nvPr>
+            <p:ph type="title"/>
+          </p:nvPr>
+        </p:nvSpPr>
+        <p:spPr/>
+        <p:txBody>
+          <a:bodyPr/>
+          <a:lstStyle/>
+          <a:p>
+            <a:r>
+              <a:rPr lang="de-DE" dirty="0"/>
+              <a:t>Terraform Registry</a:t>
+            </a:r>
+            <a:endParaRPr lang="de-DE" dirty="0"/>
+          </a:p>
+        </p:txBody>
+      </p:sp>
+      <p:pic>
+        <p:nvPicPr>
+          <p:cNvPr id="5" name="Grafik 4"/>
+          <p:cNvPicPr>
+            <a:picLocks noChangeAspect="1"/>
+          </p:cNvPicPr>
+          <p:nvPr/>
+        </p:nvPicPr>
+        <p:blipFill>
+          <a:blip r:embed="rId3"/>
+          <a:stretch>
+            <a:fillRect/>
+          </a:stretch>
+        </p:blipFill>
+        <p:spPr>
+          <a:xfrm>
+            <a:off x="1483566" y="1794934"/>
+            <a:ext cx="9699935" cy="4665133"/>
+          </a:xfrm>
+          <a:prstGeom prst="rect">
+            <a:avLst/>
+          </a:prstGeom>
+        </p:spPr>
+      </p:pic>
     </p:spTree>
     <p:extLst>
       <p:ext uri="{BB962C8B-B14F-4D97-AF65-F5344CB8AC3E}">
@@ -3473,6 +3806,2122 @@
       </p:par>
     </p:tnLst>
   </p:timing>
+</p:sld>
+</file>
+
+<file path=ppt/slides/slide3.xml><?xml version="1.0" encoding="utf-8"?>
+<p:sld xmlns:a="http://schemas.openxmlformats.org/drawingml/2006/main" xmlns:r="http://schemas.openxmlformats.org/officeDocument/2006/relationships" xmlns:p="http://schemas.openxmlformats.org/presentationml/2006/main">
+  <p:cSld>
+    <p:spTree>
+      <p:nvGrpSpPr>
+        <p:cNvPr id="1" name=""/>
+        <p:cNvGrpSpPr/>
+        <p:nvPr/>
+      </p:nvGrpSpPr>
+      <p:grpSpPr>
+        <a:xfrm>
+          <a:off x="0" y="0"/>
+          <a:ext cx="0" cy="0"/>
+          <a:chOff x="0" y="0"/>
+          <a:chExt cx="0" cy="0"/>
+        </a:xfrm>
+      </p:grpSpPr>
+      <p:sp>
+        <p:nvSpPr>
+          <p:cNvPr id="2" name="Titel 1"/>
+          <p:cNvSpPr>
+            <a:spLocks noGrp="1"/>
+          </p:cNvSpPr>
+          <p:nvPr>
+            <p:ph type="title"/>
+          </p:nvPr>
+        </p:nvSpPr>
+        <p:spPr/>
+        <p:txBody>
+          <a:bodyPr/>
+          <a:lstStyle/>
+          <a:p>
+            <a:r>
+              <a:rPr lang="de-DE" dirty="0" smtClean="0"/>
+              <a:t>Provider Status</a:t>
+            </a:r>
+            <a:endParaRPr lang="de-DE" dirty="0"/>
+          </a:p>
+        </p:txBody>
+      </p:sp>
+      <p:pic>
+        <p:nvPicPr>
+          <p:cNvPr id="4" name="Inhaltsplatzhalter 3"/>
+          <p:cNvPicPr>
+            <a:picLocks noGrp="1" noChangeAspect="1"/>
+          </p:cNvPicPr>
+          <p:nvPr>
+            <p:ph idx="1"/>
+          </p:nvPr>
+        </p:nvPicPr>
+        <p:blipFill>
+          <a:blip r:embed="rId2">
+            <a:extLst>
+              <a:ext uri="{28A0092B-C50C-407E-A947-70E740481C1C}">
+                <a14:useLocalDpi xmlns:a14="http://schemas.microsoft.com/office/drawing/2010/main" val="0"/>
+              </a:ext>
+            </a:extLst>
+          </a:blip>
+          <a:stretch>
+            <a:fillRect/>
+          </a:stretch>
+        </p:blipFill>
+        <p:spPr>
+          <a:xfrm>
+            <a:off x="4823883" y="1937809"/>
+            <a:ext cx="2400300" cy="781050"/>
+          </a:xfrm>
+        </p:spPr>
+      </p:pic>
+      <p:pic>
+        <p:nvPicPr>
+          <p:cNvPr id="5" name="Grafik 4"/>
+          <p:cNvPicPr>
+            <a:picLocks noChangeAspect="1"/>
+          </p:cNvPicPr>
+          <p:nvPr/>
+        </p:nvPicPr>
+        <p:blipFill>
+          <a:blip r:embed="rId3">
+            <a:extLst>
+              <a:ext uri="{28A0092B-C50C-407E-A947-70E740481C1C}">
+                <a14:useLocalDpi xmlns:a14="http://schemas.microsoft.com/office/drawing/2010/main" val="0"/>
+              </a:ext>
+            </a:extLst>
+          </a:blip>
+          <a:stretch>
+            <a:fillRect/>
+          </a:stretch>
+        </p:blipFill>
+        <p:spPr>
+          <a:xfrm>
+            <a:off x="1051983" y="1937809"/>
+            <a:ext cx="2400300" cy="781050"/>
+          </a:xfrm>
+          <a:prstGeom prst="rect">
+            <a:avLst/>
+          </a:prstGeom>
+        </p:spPr>
+      </p:pic>
+      <p:pic>
+        <p:nvPicPr>
+          <p:cNvPr id="6" name="Grafik 5"/>
+          <p:cNvPicPr>
+            <a:picLocks noChangeAspect="1"/>
+          </p:cNvPicPr>
+          <p:nvPr/>
+        </p:nvPicPr>
+        <p:blipFill>
+          <a:blip r:embed="rId4">
+            <a:extLst>
+              <a:ext uri="{28A0092B-C50C-407E-A947-70E740481C1C}">
+                <a14:useLocalDpi xmlns:a14="http://schemas.microsoft.com/office/drawing/2010/main" val="0"/>
+              </a:ext>
+            </a:extLst>
+          </a:blip>
+          <a:stretch>
+            <a:fillRect/>
+          </a:stretch>
+        </p:blipFill>
+        <p:spPr>
+          <a:xfrm>
+            <a:off x="8595783" y="1937809"/>
+            <a:ext cx="2400300" cy="781050"/>
+          </a:xfrm>
+          <a:prstGeom prst="rect">
+            <a:avLst/>
+          </a:prstGeom>
+        </p:spPr>
+      </p:pic>
+      <p:sp>
+        <p:nvSpPr>
+          <p:cNvPr id="7" name="Textfeld 6"/>
+          <p:cNvSpPr txBox="1"/>
+          <p:nvPr/>
+        </p:nvSpPr>
+        <p:spPr>
+          <a:xfrm>
+            <a:off x="983191" y="3107266"/>
+            <a:ext cx="2537883" cy="1569660"/>
+          </a:xfrm>
+          <a:prstGeom prst="rect">
+            <a:avLst/>
+          </a:prstGeom>
+          <a:noFill/>
+        </p:spPr>
+        <p:txBody>
+          <a:bodyPr wrap="square" rtlCol="0">
+            <a:spAutoFit/>
+          </a:bodyPr>
+          <a:lstStyle/>
+          <a:p>
+            <a:r>
+              <a:rPr lang="de-DE" sz="2400" dirty="0" smtClean="0"/>
+              <a:t>Offizielle Provider, die von </a:t>
+            </a:r>
+            <a:r>
+              <a:rPr lang="de-DE" sz="2400" dirty="0" err="1" smtClean="0"/>
+              <a:t>HashiCorp</a:t>
+            </a:r>
+            <a:r>
+              <a:rPr lang="de-DE" sz="2400" dirty="0" smtClean="0"/>
+              <a:t> bereitgestellt und gewartet werden</a:t>
+            </a:r>
+            <a:endParaRPr lang="de-DE" sz="2400" dirty="0"/>
+          </a:p>
+        </p:txBody>
+      </p:sp>
+      <p:sp>
+        <p:nvSpPr>
+          <p:cNvPr id="8" name="Textfeld 7"/>
+          <p:cNvSpPr txBox="1"/>
+          <p:nvPr/>
+        </p:nvSpPr>
+        <p:spPr>
+          <a:xfrm>
+            <a:off x="4823883" y="2974446"/>
+            <a:ext cx="2645833" cy="3416320"/>
+          </a:xfrm>
+          <a:prstGeom prst="rect">
+            <a:avLst/>
+          </a:prstGeom>
+          <a:noFill/>
+        </p:spPr>
+        <p:txBody>
+          <a:bodyPr wrap="square" rtlCol="0">
+            <a:spAutoFit/>
+          </a:bodyPr>
+          <a:lstStyle/>
+          <a:p>
+            <a:r>
+              <a:rPr lang="de-DE" sz="2400" dirty="0" smtClean="0"/>
+              <a:t>Provider die von Third-Party Partnern bereitgestellt und gewartet werden. </a:t>
+            </a:r>
+            <a:r>
+              <a:rPr lang="de-DE" sz="2400" dirty="0" err="1" smtClean="0"/>
+              <a:t>HashiCorp</a:t>
+            </a:r>
+            <a:r>
+              <a:rPr lang="de-DE" sz="2400" dirty="0" smtClean="0"/>
+              <a:t> hat die </a:t>
+            </a:r>
+            <a:r>
+              <a:rPr lang="de-DE" sz="2400" dirty="0" err="1" smtClean="0"/>
+              <a:t>authentizität</a:t>
+            </a:r>
+            <a:r>
+              <a:rPr lang="de-DE" sz="2400" dirty="0" smtClean="0"/>
+              <a:t> des Publishers verifiziert.</a:t>
+            </a:r>
+            <a:endParaRPr lang="de-DE" sz="2400" dirty="0"/>
+          </a:p>
+        </p:txBody>
+      </p:sp>
+      <p:sp>
+        <p:nvSpPr>
+          <p:cNvPr id="9" name="Textfeld 8"/>
+          <p:cNvSpPr txBox="1"/>
+          <p:nvPr/>
+        </p:nvSpPr>
+        <p:spPr>
+          <a:xfrm>
+            <a:off x="8572499" y="2957513"/>
+            <a:ext cx="2645833" cy="1569660"/>
+          </a:xfrm>
+          <a:prstGeom prst="rect">
+            <a:avLst/>
+          </a:prstGeom>
+          <a:noFill/>
+        </p:spPr>
+        <p:txBody>
+          <a:bodyPr wrap="square" rtlCol="0">
+            <a:spAutoFit/>
+          </a:bodyPr>
+          <a:lstStyle/>
+          <a:p>
+            <a:r>
+              <a:rPr lang="de-DE" sz="2400" dirty="0" smtClean="0"/>
+              <a:t>Provider die von der Community bereitgestellt und gewartet werden.</a:t>
+            </a:r>
+            <a:endParaRPr lang="de-DE" sz="2400" dirty="0"/>
+          </a:p>
+        </p:txBody>
+      </p:sp>
+    </p:spTree>
+    <p:extLst>
+      <p:ext uri="{BB962C8B-B14F-4D97-AF65-F5344CB8AC3E}">
+        <p14:creationId xmlns:p14="http://schemas.microsoft.com/office/powerpoint/2010/main" val="2621609267"/>
+      </p:ext>
+    </p:extLst>
+  </p:cSld>
+  <p:clrMapOvr>
+    <a:masterClrMapping/>
+  </p:clrMapOvr>
+</p:sld>
+</file>
+
+<file path=ppt/slides/slide4.xml><?xml version="1.0" encoding="utf-8"?>
+<p:sld xmlns:a="http://schemas.openxmlformats.org/drawingml/2006/main" xmlns:r="http://schemas.openxmlformats.org/officeDocument/2006/relationships" xmlns:p="http://schemas.openxmlformats.org/presentationml/2006/main">
+  <p:cSld>
+    <p:spTree>
+      <p:nvGrpSpPr>
+        <p:cNvPr id="1" name=""/>
+        <p:cNvGrpSpPr/>
+        <p:nvPr/>
+      </p:nvGrpSpPr>
+      <p:grpSpPr>
+        <a:xfrm>
+          <a:off x="0" y="0"/>
+          <a:ext cx="0" cy="0"/>
+          <a:chOff x="0" y="0"/>
+          <a:chExt cx="0" cy="0"/>
+        </a:xfrm>
+      </p:grpSpPr>
+      <p:sp>
+        <p:nvSpPr>
+          <p:cNvPr id="2" name="Titel 1"/>
+          <p:cNvSpPr>
+            <a:spLocks noGrp="1"/>
+          </p:cNvSpPr>
+          <p:nvPr>
+            <p:ph type="title"/>
+          </p:nvPr>
+        </p:nvSpPr>
+        <p:spPr/>
+        <p:txBody>
+          <a:bodyPr/>
+          <a:lstStyle/>
+          <a:p>
+            <a:r>
+              <a:rPr lang="de-DE" dirty="0" smtClean="0"/>
+              <a:t>Provider </a:t>
+            </a:r>
+            <a:r>
+              <a:rPr lang="de-DE" dirty="0" err="1" smtClean="0"/>
+              <a:t>Requirements</a:t>
+            </a:r>
+            <a:endParaRPr lang="de-DE" dirty="0"/>
+          </a:p>
+        </p:txBody>
+      </p:sp>
+      <mc:AlternateContent xmlns:mc="http://schemas.openxmlformats.org/markup-compatibility/2006">
+        <mc:Choice xmlns:a14="http://schemas.microsoft.com/office/drawing/2010/main" Requires="a14">
+          <p:sp>
+            <p:nvSpPr>
+              <p:cNvPr id="3" name="Inhaltsplatzhalter 2"/>
+              <p:cNvSpPr>
+                <a:spLocks noGrp="1"/>
+              </p:cNvSpPr>
+              <p:nvPr>
+                <p:ph idx="1"/>
+              </p:nvPr>
+            </p:nvSpPr>
+            <p:spPr/>
+            <p:txBody>
+              <a:bodyPr/>
+              <a:lstStyle/>
+              <a:p>
+                <a:r>
+                  <a:rPr lang="de-DE" dirty="0" smtClean="0"/>
+                  <a:t>Angabe der benötigten Provider und Providerversion </a:t>
+                </a:r>
+              </a:p>
+              <a:p>
+                <a:r>
+                  <a:rPr lang="de-DE" dirty="0" smtClean="0"/>
+                  <a:t>Version-</a:t>
+                </a:r>
+                <a:r>
+                  <a:rPr lang="de-DE" dirty="0" err="1" smtClean="0"/>
+                  <a:t>Pinning</a:t>
+                </a:r>
+                <a:r>
+                  <a:rPr lang="de-DE" dirty="0" smtClean="0"/>
+                  <a:t> empfohlen</a:t>
+                </a:r>
+              </a:p>
+              <a:p>
+                <a:pPr lvl="2"/>
+                <a:r>
+                  <a:rPr lang="de-DE" dirty="0" smtClean="0"/>
+                  <a:t>Minimale Version "</a:t>
+                </a:r>
+                <a:r>
+                  <a:rPr lang="de-DE" dirty="0" smtClean="0">
+                    <a:latin typeface="Consolas" panose="020B0609020204030204" pitchFamily="49" charset="0"/>
+                  </a:rPr>
+                  <a:t>&gt;=3.0.0</a:t>
+                </a:r>
+                <a14:m>
+                  <m:oMath xmlns:m="http://schemas.openxmlformats.org/officeDocument/2006/math">
+                    <m:r>
+                      <a:rPr lang="de-DE" i="1" dirty="0" smtClean="0">
+                        <a:latin typeface="Cambria Math" panose="02040503050406030204" pitchFamily="18" charset="0"/>
+                      </a:rPr>
+                      <m:t>"</m:t>
+                    </m:r>
+                  </m:oMath>
+                </a14:m>
+                <a:endParaRPr lang="de-DE" dirty="0" smtClean="0"/>
+              </a:p>
+              <a:p>
+                <a:pPr lvl="2"/>
+                <a:r>
+                  <a:rPr lang="de-DE" dirty="0" smtClean="0"/>
+                  <a:t>Einschränkung auf Mayor-Version </a:t>
+                </a:r>
+                <a:r>
+                  <a:rPr lang="de-DE" dirty="0" smtClean="0">
+                    <a:latin typeface="Consolas" panose="020B0609020204030204" pitchFamily="49" charset="0"/>
+                  </a:rPr>
+                  <a:t>"~&gt;3.0</a:t>
+                </a:r>
+                <a14:m>
+                  <m:oMath xmlns:m="http://schemas.openxmlformats.org/officeDocument/2006/math">
+                    <m:r>
+                      <a:rPr lang="de-DE" i="1" dirty="0" smtClean="0">
+                        <a:latin typeface="Cambria Math" panose="02040503050406030204" pitchFamily="18" charset="0"/>
+                      </a:rPr>
+                      <m:t>"</m:t>
+                    </m:r>
+                  </m:oMath>
+                </a14:m>
+                <a:endParaRPr lang="de-DE" dirty="0" smtClean="0"/>
+              </a:p>
+              <a:p>
+                <a:pPr lvl="2"/>
+                <a:endParaRPr lang="de-DE" dirty="0"/>
+              </a:p>
+              <a:p>
+                <a:pPr lvl="2"/>
+                <a:endParaRPr lang="de-DE" dirty="0" smtClean="0"/>
+              </a:p>
+            </p:txBody>
+          </p:sp>
+        </mc:Choice>
+        <mc:Fallback>
+          <p:sp>
+            <p:nvSpPr>
+              <p:cNvPr id="3" name="Inhaltsplatzhalter 2"/>
+              <p:cNvSpPr>
+                <a:spLocks noGrp="1" noRot="1" noChangeAspect="1" noMove="1" noResize="1" noEditPoints="1" noAdjustHandles="1" noChangeArrowheads="1" noChangeShapeType="1" noTextEdit="1"/>
+              </p:cNvSpPr>
+              <p:nvPr>
+                <p:ph idx="1"/>
+              </p:nvPr>
+            </p:nvSpPr>
+            <p:spPr>
+              <a:blipFill rotWithShape="0">
+                <a:blip r:embed="rId3"/>
+                <a:stretch>
+                  <a:fillRect l="-1043" t="-2241"/>
+                </a:stretch>
+              </a:blipFill>
+            </p:spPr>
+            <p:txBody>
+              <a:bodyPr/>
+              <a:lstStyle/>
+              <a:p>
+                <a:r>
+                  <a:rPr lang="de-DE">
+                    <a:noFill/>
+                  </a:rPr>
+                  <a:t> </a:t>
+                </a:r>
+              </a:p>
+            </p:txBody>
+          </p:sp>
+        </mc:Fallback>
+      </mc:AlternateContent>
+      <p:sp>
+        <p:nvSpPr>
+          <p:cNvPr id="5" name="Rectangle 2"/>
+          <p:cNvSpPr>
+            <a:spLocks noChangeArrowheads="1"/>
+          </p:cNvSpPr>
+          <p:nvPr/>
+        </p:nvSpPr>
+        <p:spPr bwMode="auto">
+          <a:xfrm>
+            <a:off x="4897967" y="3971236"/>
+            <a:ext cx="3585633" cy="2554545"/>
+          </a:xfrm>
+          <a:prstGeom prst="rect">
+            <a:avLst/>
+          </a:prstGeom>
+          <a:solidFill>
+            <a:srgbClr val="282C34"/>
+          </a:solidFill>
+          <a:ln>
+            <a:noFill/>
+          </a:ln>
+          <a:effectLst/>
+          <a:extLst>
+            <a:ext uri="{91240B29-F687-4F45-9708-019B960494DF}">
+              <a14:hiddenLine xmlns:a14="http://schemas.microsoft.com/office/drawing/2010/main" w="9525">
+                <a:solidFill>
+                  <a:schemeClr val="tx1"/>
+                </a:solidFill>
+                <a:miter lim="800000"/>
+                <a:headEnd/>
+                <a:tailEnd/>
+              </a14:hiddenLine>
+            </a:ext>
+            <a:ext uri="{AF507438-7753-43E0-B8FC-AC1667EBCBE1}">
+              <a14:hiddenEffects xmlns:a14="http://schemas.microsoft.com/office/drawing/2010/main">
+                <a:effectLst>
+                  <a:outerShdw dist="35921" dir="2700000" algn="ctr" rotWithShape="0">
+                    <a:schemeClr val="bg2"/>
+                  </a:outerShdw>
+                </a:effectLst>
+              </a14:hiddenEffects>
+            </a:ext>
+          </a:extLst>
+        </p:spPr>
+        <p:txBody>
+          <a:bodyPr vert="horz" wrap="square" lIns="91440" tIns="45720" rIns="91440" bIns="45720" numCol="1" anchor="ctr" anchorCtr="0" compatLnSpc="1">
+            <a:prstTxWarp prst="textNoShape">
+              <a:avLst/>
+            </a:prstTxWarp>
+            <a:spAutoFit/>
+          </a:bodyPr>
+          <a:lstStyle/>
+          <a:p>
+            <a:pPr lvl="0" eaLnBrk="0" fontAlgn="base" hangingPunct="0">
+              <a:spcBef>
+                <a:spcPct val="0"/>
+              </a:spcBef>
+              <a:spcAft>
+                <a:spcPct val="0"/>
+              </a:spcAft>
+            </a:pPr>
+            <a:r>
+              <a:rPr kumimoji="0" lang="de-DE" altLang="de-DE" sz="2000" b="0" i="1" u="none" strike="noStrike" cap="none" normalizeH="0" baseline="0" dirty="0" err="1" smtClean="0">
+                <a:ln>
+                  <a:noFill/>
+                </a:ln>
+                <a:solidFill>
+                  <a:srgbClr val="D55FDE"/>
+                </a:solidFill>
+                <a:effectLst/>
+                <a:latin typeface="JetBrains Mono"/>
+              </a:rPr>
+              <a:t>terraform</a:t>
+            </a:r>
+            <a:r>
+              <a:rPr kumimoji="0" lang="de-DE" altLang="de-DE" sz="2000" b="0" i="1" u="none" strike="noStrike" cap="none" normalizeH="0" baseline="0" dirty="0" smtClean="0">
+                <a:ln>
+                  <a:noFill/>
+                </a:ln>
+                <a:solidFill>
+                  <a:srgbClr val="D55FDE"/>
+                </a:solidFill>
+                <a:effectLst/>
+                <a:latin typeface="JetBrains Mono"/>
+              </a:rPr>
+              <a:t> </a:t>
+            </a:r>
+            <a:r>
+              <a:rPr kumimoji="0" lang="de-DE" altLang="de-DE" sz="2000" b="0" i="0" u="none" strike="noStrike" cap="none" normalizeH="0" baseline="0" dirty="0" smtClean="0">
+                <a:ln>
+                  <a:noFill/>
+                </a:ln>
+                <a:solidFill>
+                  <a:srgbClr val="BBBBBB"/>
+                </a:solidFill>
+                <a:effectLst/>
+                <a:latin typeface="JetBrains Mono"/>
+              </a:rPr>
+              <a:t>{</a:t>
+            </a:r>
+            <a:br>
+              <a:rPr kumimoji="0" lang="de-DE" altLang="de-DE" sz="2000" b="0" i="0" u="none" strike="noStrike" cap="none" normalizeH="0" baseline="0" dirty="0" smtClean="0">
+                <a:ln>
+                  <a:noFill/>
+                </a:ln>
+                <a:solidFill>
+                  <a:srgbClr val="BBBBBB"/>
+                </a:solidFill>
+                <a:effectLst/>
+                <a:latin typeface="JetBrains Mono"/>
+              </a:rPr>
+            </a:br>
+            <a:r>
+              <a:rPr kumimoji="0" lang="de-DE" altLang="de-DE" sz="2000" b="0" i="0" u="none" strike="noStrike" cap="none" normalizeH="0" baseline="0" dirty="0" smtClean="0">
+                <a:ln>
+                  <a:noFill/>
+                </a:ln>
+                <a:solidFill>
+                  <a:srgbClr val="BBBBBB"/>
+                </a:solidFill>
+                <a:effectLst/>
+                <a:latin typeface="JetBrains Mono"/>
+              </a:rPr>
+              <a:t>  </a:t>
+            </a:r>
+            <a:r>
+              <a:rPr kumimoji="0" lang="de-DE" altLang="de-DE" sz="2000" b="0" i="1" u="none" strike="noStrike" cap="none" normalizeH="0" baseline="0" dirty="0" err="1" smtClean="0">
+                <a:ln>
+                  <a:noFill/>
+                </a:ln>
+                <a:solidFill>
+                  <a:srgbClr val="D55FDE"/>
+                </a:solidFill>
+                <a:effectLst/>
+                <a:latin typeface="JetBrains Mono"/>
+              </a:rPr>
+              <a:t>required_providers</a:t>
+            </a:r>
+            <a:r>
+              <a:rPr kumimoji="0" lang="de-DE" altLang="de-DE" sz="2000" b="0" i="1" u="none" strike="noStrike" cap="none" normalizeH="0" baseline="0" dirty="0" smtClean="0">
+                <a:ln>
+                  <a:noFill/>
+                </a:ln>
+                <a:solidFill>
+                  <a:srgbClr val="D55FDE"/>
+                </a:solidFill>
+                <a:effectLst/>
+                <a:latin typeface="JetBrains Mono"/>
+              </a:rPr>
+              <a:t> </a:t>
+            </a:r>
+            <a:r>
+              <a:rPr kumimoji="0" lang="de-DE" altLang="de-DE" sz="2000" b="0" i="0" u="none" strike="noStrike" cap="none" normalizeH="0" baseline="0" dirty="0" smtClean="0">
+                <a:ln>
+                  <a:noFill/>
+                </a:ln>
+                <a:solidFill>
+                  <a:srgbClr val="BBBBBB"/>
+                </a:solidFill>
+                <a:effectLst/>
+                <a:latin typeface="JetBrains Mono"/>
+              </a:rPr>
+              <a:t>{</a:t>
+            </a:r>
+            <a:br>
+              <a:rPr kumimoji="0" lang="de-DE" altLang="de-DE" sz="2000" b="0" i="0" u="none" strike="noStrike" cap="none" normalizeH="0" baseline="0" dirty="0" smtClean="0">
+                <a:ln>
+                  <a:noFill/>
+                </a:ln>
+                <a:solidFill>
+                  <a:srgbClr val="BBBBBB"/>
+                </a:solidFill>
+                <a:effectLst/>
+                <a:latin typeface="JetBrains Mono"/>
+              </a:rPr>
+            </a:br>
+            <a:r>
+              <a:rPr kumimoji="0" lang="de-DE" altLang="de-DE" sz="2000" b="0" i="0" u="none" strike="noStrike" cap="none" normalizeH="0" baseline="0" dirty="0" smtClean="0">
+                <a:ln>
+                  <a:noFill/>
+                </a:ln>
+                <a:solidFill>
+                  <a:srgbClr val="BBBBBB"/>
+                </a:solidFill>
+                <a:effectLst/>
+                <a:latin typeface="JetBrains Mono"/>
+              </a:rPr>
+              <a:t>    </a:t>
+            </a:r>
+            <a:r>
+              <a:rPr kumimoji="0" lang="de-DE" altLang="de-DE" sz="2000" b="0" i="0" u="none" strike="noStrike" cap="none" normalizeH="0" baseline="0" dirty="0" err="1" smtClean="0">
+                <a:ln>
+                  <a:noFill/>
+                </a:ln>
+                <a:solidFill>
+                  <a:srgbClr val="EF596F"/>
+                </a:solidFill>
+                <a:effectLst/>
+                <a:latin typeface="JetBrains Mono"/>
+              </a:rPr>
+              <a:t>aws</a:t>
+            </a:r>
+            <a:r>
+              <a:rPr kumimoji="0" lang="de-DE" altLang="de-DE" sz="2000" b="0" i="0" u="none" strike="noStrike" cap="none" normalizeH="0" baseline="0" dirty="0" smtClean="0">
+                <a:ln>
+                  <a:noFill/>
+                </a:ln>
+                <a:solidFill>
+                  <a:srgbClr val="EF596F"/>
+                </a:solidFill>
+                <a:effectLst/>
+                <a:latin typeface="JetBrains Mono"/>
+              </a:rPr>
+              <a:t> </a:t>
+            </a:r>
+            <a:r>
+              <a:rPr kumimoji="0" lang="de-DE" altLang="de-DE" sz="2000" b="0" i="0" u="none" strike="noStrike" cap="none" normalizeH="0" baseline="0" dirty="0" smtClean="0">
+                <a:ln>
+                  <a:noFill/>
+                </a:ln>
+                <a:solidFill>
+                  <a:srgbClr val="BBBBBB"/>
+                </a:solidFill>
+                <a:effectLst/>
+                <a:latin typeface="JetBrains Mono"/>
+              </a:rPr>
+              <a:t>= {</a:t>
+            </a:r>
+            <a:br>
+              <a:rPr kumimoji="0" lang="de-DE" altLang="de-DE" sz="2000" b="0" i="0" u="none" strike="noStrike" cap="none" normalizeH="0" baseline="0" dirty="0" smtClean="0">
+                <a:ln>
+                  <a:noFill/>
+                </a:ln>
+                <a:solidFill>
+                  <a:srgbClr val="BBBBBB"/>
+                </a:solidFill>
+                <a:effectLst/>
+                <a:latin typeface="JetBrains Mono"/>
+              </a:rPr>
+            </a:br>
+            <a:r>
+              <a:rPr kumimoji="0" lang="de-DE" altLang="de-DE" sz="2000" b="0" i="0" u="none" strike="noStrike" cap="none" normalizeH="0" baseline="0" dirty="0" smtClean="0">
+                <a:ln>
+                  <a:noFill/>
+                </a:ln>
+                <a:solidFill>
+                  <a:srgbClr val="BBBBBB"/>
+                </a:solidFill>
+                <a:effectLst/>
+                <a:latin typeface="JetBrains Mono"/>
+              </a:rPr>
+              <a:t>      </a:t>
+            </a:r>
+            <a:r>
+              <a:rPr kumimoji="0" lang="de-DE" altLang="de-DE" sz="2000" b="0" i="0" u="none" strike="noStrike" cap="none" normalizeH="0" baseline="0" dirty="0" err="1" smtClean="0">
+                <a:ln>
+                  <a:noFill/>
+                </a:ln>
+                <a:solidFill>
+                  <a:srgbClr val="EF596F"/>
+                </a:solidFill>
+                <a:effectLst/>
+                <a:latin typeface="JetBrains Mono"/>
+              </a:rPr>
+              <a:t>source</a:t>
+            </a:r>
+            <a:r>
+              <a:rPr kumimoji="0" lang="de-DE" altLang="de-DE" sz="2000" b="0" i="0" u="none" strike="noStrike" cap="none" normalizeH="0" baseline="0" dirty="0" smtClean="0">
+                <a:ln>
+                  <a:noFill/>
+                </a:ln>
+                <a:solidFill>
+                  <a:srgbClr val="EF596F"/>
+                </a:solidFill>
+                <a:effectLst/>
+                <a:latin typeface="JetBrains Mono"/>
+              </a:rPr>
+              <a:t>  </a:t>
+            </a:r>
+            <a:r>
+              <a:rPr kumimoji="0" lang="de-DE" altLang="de-DE" sz="2000" b="0" i="0" u="none" strike="noStrike" cap="none" normalizeH="0" baseline="0" dirty="0" smtClean="0">
+                <a:ln>
+                  <a:noFill/>
+                </a:ln>
+                <a:solidFill>
+                  <a:srgbClr val="BBBBBB"/>
+                </a:solidFill>
+                <a:effectLst/>
+                <a:latin typeface="JetBrains Mono"/>
+              </a:rPr>
+              <a:t>= </a:t>
+            </a:r>
+            <a:r>
+              <a:rPr kumimoji="0" lang="de-DE" altLang="de-DE" sz="2000" b="0" i="0" u="none" strike="noStrike" cap="none" normalizeH="0" baseline="0" dirty="0" smtClean="0">
+                <a:ln>
+                  <a:noFill/>
+                </a:ln>
+                <a:solidFill>
+                  <a:srgbClr val="89CA78"/>
+                </a:solidFill>
+                <a:effectLst/>
+                <a:latin typeface="JetBrains Mono"/>
+              </a:rPr>
+              <a:t>"</a:t>
+            </a:r>
+            <a:r>
+              <a:rPr kumimoji="0" lang="de-DE" altLang="de-DE" sz="2000" b="0" i="0" u="none" strike="noStrike" cap="none" normalizeH="0" baseline="0" dirty="0" err="1" smtClean="0">
+                <a:ln>
+                  <a:noFill/>
+                </a:ln>
+                <a:solidFill>
+                  <a:srgbClr val="89CA78"/>
+                </a:solidFill>
+                <a:effectLst/>
+                <a:latin typeface="JetBrains Mono"/>
+              </a:rPr>
+              <a:t>hashicorp</a:t>
+            </a:r>
+            <a:r>
+              <a:rPr kumimoji="0" lang="de-DE" altLang="de-DE" sz="2000" b="0" i="0" u="none" strike="noStrike" cap="none" normalizeH="0" baseline="0" dirty="0" smtClean="0">
+                <a:ln>
+                  <a:noFill/>
+                </a:ln>
+                <a:solidFill>
+                  <a:srgbClr val="89CA78"/>
+                </a:solidFill>
+                <a:effectLst/>
+                <a:latin typeface="JetBrains Mono"/>
+              </a:rPr>
+              <a:t>/</a:t>
+            </a:r>
+            <a:r>
+              <a:rPr kumimoji="0" lang="de-DE" altLang="de-DE" sz="2000" b="0" i="0" u="none" strike="noStrike" cap="none" normalizeH="0" baseline="0" dirty="0" err="1" smtClean="0">
+                <a:ln>
+                  <a:noFill/>
+                </a:ln>
+                <a:solidFill>
+                  <a:srgbClr val="89CA78"/>
+                </a:solidFill>
+                <a:effectLst/>
+                <a:latin typeface="JetBrains Mono"/>
+              </a:rPr>
+              <a:t>aws</a:t>
+            </a:r>
+            <a:r>
+              <a:rPr kumimoji="0" lang="de-DE" altLang="de-DE" sz="2000" b="0" i="0" u="none" strike="noStrike" cap="none" normalizeH="0" baseline="0" dirty="0" smtClean="0">
+                <a:ln>
+                  <a:noFill/>
+                </a:ln>
+                <a:solidFill>
+                  <a:srgbClr val="89CA78"/>
+                </a:solidFill>
+                <a:effectLst/>
+                <a:latin typeface="JetBrains Mono"/>
+              </a:rPr>
+              <a:t>"</a:t>
+            </a:r>
+            <a:br>
+              <a:rPr kumimoji="0" lang="de-DE" altLang="de-DE" sz="2000" b="0" i="0" u="none" strike="noStrike" cap="none" normalizeH="0" baseline="0" dirty="0" smtClean="0">
+                <a:ln>
+                  <a:noFill/>
+                </a:ln>
+                <a:solidFill>
+                  <a:srgbClr val="89CA78"/>
+                </a:solidFill>
+                <a:effectLst/>
+                <a:latin typeface="JetBrains Mono"/>
+              </a:rPr>
+            </a:br>
+            <a:r>
+              <a:rPr kumimoji="0" lang="de-DE" altLang="de-DE" sz="2000" b="0" i="0" u="none" strike="noStrike" cap="none" normalizeH="0" baseline="0" dirty="0" smtClean="0">
+                <a:ln>
+                  <a:noFill/>
+                </a:ln>
+                <a:solidFill>
+                  <a:srgbClr val="89CA78"/>
+                </a:solidFill>
+                <a:effectLst/>
+                <a:latin typeface="JetBrains Mono"/>
+              </a:rPr>
+              <a:t>      </a:t>
+            </a:r>
+            <a:r>
+              <a:rPr kumimoji="0" lang="de-DE" altLang="de-DE" sz="2000" b="0" i="0" u="none" strike="noStrike" cap="none" normalizeH="0" baseline="0" dirty="0" err="1" smtClean="0">
+                <a:ln>
+                  <a:noFill/>
+                </a:ln>
+                <a:solidFill>
+                  <a:srgbClr val="EF596F"/>
+                </a:solidFill>
+                <a:effectLst/>
+                <a:latin typeface="JetBrains Mono"/>
+              </a:rPr>
+              <a:t>version</a:t>
+            </a:r>
+            <a:r>
+              <a:rPr kumimoji="0" lang="de-DE" altLang="de-DE" sz="2000" b="0" i="0" u="none" strike="noStrike" cap="none" normalizeH="0" baseline="0" dirty="0" smtClean="0">
+                <a:ln>
+                  <a:noFill/>
+                </a:ln>
+                <a:solidFill>
+                  <a:srgbClr val="EF596F"/>
+                </a:solidFill>
+                <a:effectLst/>
+                <a:latin typeface="JetBrains Mono"/>
+              </a:rPr>
+              <a:t> </a:t>
+            </a:r>
+            <a:r>
+              <a:rPr kumimoji="0" lang="de-DE" altLang="de-DE" sz="2000" b="0" i="0" u="none" strike="noStrike" cap="none" normalizeH="0" baseline="0" dirty="0" smtClean="0">
+                <a:ln>
+                  <a:noFill/>
+                </a:ln>
+                <a:solidFill>
+                  <a:srgbClr val="BBBBBB"/>
+                </a:solidFill>
+                <a:effectLst/>
+                <a:latin typeface="JetBrains Mono"/>
+              </a:rPr>
+              <a:t>= </a:t>
+            </a:r>
+            <a:r>
+              <a:rPr kumimoji="0" lang="de-DE" altLang="de-DE" sz="2000" b="0" i="0" u="none" strike="noStrike" cap="none" normalizeH="0" baseline="0" dirty="0" smtClean="0">
+                <a:ln>
+                  <a:noFill/>
+                </a:ln>
+                <a:solidFill>
+                  <a:srgbClr val="89CA78"/>
+                </a:solidFill>
+                <a:effectLst/>
+                <a:latin typeface="JetBrains Mono"/>
+              </a:rPr>
+              <a:t>"3.65.0"</a:t>
+            </a:r>
+            <a:br>
+              <a:rPr kumimoji="0" lang="de-DE" altLang="de-DE" sz="2000" b="0" i="0" u="none" strike="noStrike" cap="none" normalizeH="0" baseline="0" dirty="0" smtClean="0">
+                <a:ln>
+                  <a:noFill/>
+                </a:ln>
+                <a:solidFill>
+                  <a:srgbClr val="89CA78"/>
+                </a:solidFill>
+                <a:effectLst/>
+                <a:latin typeface="JetBrains Mono"/>
+              </a:rPr>
+            </a:br>
+            <a:r>
+              <a:rPr kumimoji="0" lang="de-DE" altLang="de-DE" sz="2000" b="0" i="0" u="none" strike="noStrike" cap="none" normalizeH="0" baseline="0" dirty="0" smtClean="0">
+                <a:ln>
+                  <a:noFill/>
+                </a:ln>
+                <a:solidFill>
+                  <a:srgbClr val="89CA78"/>
+                </a:solidFill>
+                <a:effectLst/>
+                <a:latin typeface="JetBrains Mono"/>
+              </a:rPr>
+              <a:t>    </a:t>
+            </a:r>
+            <a:r>
+              <a:rPr kumimoji="0" lang="de-DE" altLang="de-DE" sz="2000" b="0" i="0" u="none" strike="noStrike" cap="none" normalizeH="0" baseline="0" dirty="0" smtClean="0">
+                <a:ln>
+                  <a:noFill/>
+                </a:ln>
+                <a:solidFill>
+                  <a:srgbClr val="BBBBBB"/>
+                </a:solidFill>
+                <a:effectLst/>
+                <a:latin typeface="JetBrains Mono"/>
+              </a:rPr>
+              <a:t>}</a:t>
+            </a:r>
+            <a:br>
+              <a:rPr kumimoji="0" lang="de-DE" altLang="de-DE" sz="2000" b="0" i="0" u="none" strike="noStrike" cap="none" normalizeH="0" baseline="0" dirty="0" smtClean="0">
+                <a:ln>
+                  <a:noFill/>
+                </a:ln>
+                <a:solidFill>
+                  <a:srgbClr val="BBBBBB"/>
+                </a:solidFill>
+                <a:effectLst/>
+                <a:latin typeface="JetBrains Mono"/>
+              </a:rPr>
+            </a:br>
+            <a:r>
+              <a:rPr kumimoji="0" lang="de-DE" altLang="de-DE" sz="2000" b="0" i="0" u="none" strike="noStrike" cap="none" normalizeH="0" baseline="0" dirty="0" smtClean="0">
+                <a:ln>
+                  <a:noFill/>
+                </a:ln>
+                <a:solidFill>
+                  <a:srgbClr val="BBBBBB"/>
+                </a:solidFill>
+                <a:effectLst/>
+                <a:latin typeface="JetBrains Mono"/>
+              </a:rPr>
+              <a:t>  }</a:t>
+            </a:r>
+            <a:br>
+              <a:rPr kumimoji="0" lang="de-DE" altLang="de-DE" sz="2000" b="0" i="0" u="none" strike="noStrike" cap="none" normalizeH="0" baseline="0" dirty="0" smtClean="0">
+                <a:ln>
+                  <a:noFill/>
+                </a:ln>
+                <a:solidFill>
+                  <a:srgbClr val="BBBBBB"/>
+                </a:solidFill>
+                <a:effectLst/>
+                <a:latin typeface="JetBrains Mono"/>
+              </a:rPr>
+            </a:br>
+            <a:r>
+              <a:rPr kumimoji="0" lang="de-DE" altLang="de-DE" sz="2000" b="0" i="0" u="none" strike="noStrike" cap="none" normalizeH="0" baseline="0" dirty="0" smtClean="0">
+                <a:ln>
+                  <a:noFill/>
+                </a:ln>
+                <a:solidFill>
+                  <a:srgbClr val="BBBBBB"/>
+                </a:solidFill>
+                <a:effectLst/>
+                <a:latin typeface="JetBrains Mono"/>
+              </a:rPr>
+              <a:t>}</a:t>
+            </a:r>
+            <a:endParaRPr kumimoji="0" lang="de-DE" altLang="de-DE" sz="4400" b="0" i="0" u="none" strike="noStrike" cap="none" normalizeH="0" baseline="0" dirty="0" smtClean="0">
+              <a:ln>
+                <a:noFill/>
+              </a:ln>
+              <a:solidFill>
+                <a:schemeClr val="tx1"/>
+              </a:solidFill>
+              <a:effectLst/>
+              <a:latin typeface="Arial" panose="020B0604020202020204" pitchFamily="34" charset="0"/>
+            </a:endParaRPr>
+          </a:p>
+        </p:txBody>
+      </p:sp>
+      <p:sp>
+        <p:nvSpPr>
+          <p:cNvPr id="6" name="Textfeld 5"/>
+          <p:cNvSpPr txBox="1"/>
+          <p:nvPr/>
+        </p:nvSpPr>
+        <p:spPr>
+          <a:xfrm>
+            <a:off x="1765352" y="3971236"/>
+            <a:ext cx="2228880" cy="461665"/>
+          </a:xfrm>
+          <a:prstGeom prst="rect">
+            <a:avLst/>
+          </a:prstGeom>
+          <a:noFill/>
+        </p:spPr>
+        <p:txBody>
+          <a:bodyPr wrap="none" rtlCol="0">
+            <a:spAutoFit/>
+          </a:bodyPr>
+          <a:lstStyle/>
+          <a:p>
+            <a:r>
+              <a:rPr lang="de-DE" sz="2400" b="1" dirty="0" smtClean="0"/>
+              <a:t>Terraform-Block</a:t>
+            </a:r>
+            <a:endParaRPr lang="de-DE" b="1" dirty="0"/>
+          </a:p>
+        </p:txBody>
+      </p:sp>
+      <p:cxnSp>
+        <p:nvCxnSpPr>
+          <p:cNvPr id="7" name="Gerade Verbindung mit Pfeil 6"/>
+          <p:cNvCxnSpPr/>
+          <p:nvPr/>
+        </p:nvCxnSpPr>
+        <p:spPr>
+          <a:xfrm>
+            <a:off x="4102182" y="4202069"/>
+            <a:ext cx="604210" cy="0"/>
+          </a:xfrm>
+          <a:prstGeom prst="straightConnector1">
+            <a:avLst/>
+          </a:prstGeom>
+          <a:ln w="76200">
+            <a:solidFill>
+              <a:schemeClr val="accent1">
+                <a:lumMod val="60000"/>
+                <a:lumOff val="40000"/>
+              </a:schemeClr>
+            </a:solidFill>
+            <a:tailEnd type="triangle"/>
+          </a:ln>
+        </p:spPr>
+        <p:style>
+          <a:lnRef idx="1">
+            <a:schemeClr val="accent1"/>
+          </a:lnRef>
+          <a:fillRef idx="0">
+            <a:schemeClr val="accent1"/>
+          </a:fillRef>
+          <a:effectRef idx="0">
+            <a:schemeClr val="accent1"/>
+          </a:effectRef>
+          <a:fontRef idx="minor">
+            <a:schemeClr val="tx1"/>
+          </a:fontRef>
+        </p:style>
+      </p:cxnSp>
+      <p:sp>
+        <p:nvSpPr>
+          <p:cNvPr id="8" name="Textfeld 7"/>
+          <p:cNvSpPr txBox="1"/>
+          <p:nvPr/>
+        </p:nvSpPr>
+        <p:spPr>
+          <a:xfrm>
+            <a:off x="314576" y="4691838"/>
+            <a:ext cx="3729482" cy="461665"/>
+          </a:xfrm>
+          <a:prstGeom prst="rect">
+            <a:avLst/>
+          </a:prstGeom>
+          <a:noFill/>
+        </p:spPr>
+        <p:txBody>
+          <a:bodyPr wrap="none" rtlCol="0">
+            <a:spAutoFit/>
+          </a:bodyPr>
+          <a:lstStyle/>
+          <a:p>
+            <a:r>
+              <a:rPr lang="de-DE" sz="2400" b="1" dirty="0" smtClean="0"/>
+              <a:t>Lokaler Name des Providers</a:t>
+            </a:r>
+            <a:endParaRPr lang="de-DE" b="1" dirty="0"/>
+          </a:p>
+        </p:txBody>
+      </p:sp>
+      <p:cxnSp>
+        <p:nvCxnSpPr>
+          <p:cNvPr id="9" name="Gerade Verbindung mit Pfeil 8"/>
+          <p:cNvCxnSpPr>
+            <a:stCxn id="8" idx="3"/>
+          </p:cNvCxnSpPr>
+          <p:nvPr/>
+        </p:nvCxnSpPr>
+        <p:spPr>
+          <a:xfrm flipV="1">
+            <a:off x="4044058" y="4847408"/>
+            <a:ext cx="1078275" cy="75263"/>
+          </a:xfrm>
+          <a:prstGeom prst="straightConnector1">
+            <a:avLst/>
+          </a:prstGeom>
+          <a:ln w="76200">
+            <a:solidFill>
+              <a:schemeClr val="accent1">
+                <a:lumMod val="60000"/>
+                <a:lumOff val="40000"/>
+              </a:schemeClr>
+            </a:solidFill>
+            <a:tailEnd type="triangle"/>
+          </a:ln>
+        </p:spPr>
+        <p:style>
+          <a:lnRef idx="1">
+            <a:schemeClr val="accent1"/>
+          </a:lnRef>
+          <a:fillRef idx="0">
+            <a:schemeClr val="accent1"/>
+          </a:fillRef>
+          <a:effectRef idx="0">
+            <a:schemeClr val="accent1"/>
+          </a:effectRef>
+          <a:fontRef idx="minor">
+            <a:schemeClr val="tx1"/>
+          </a:fontRef>
+        </p:style>
+      </p:cxnSp>
+      <p:sp>
+        <p:nvSpPr>
+          <p:cNvPr id="13" name="Textfeld 12"/>
+          <p:cNvSpPr txBox="1"/>
+          <p:nvPr/>
+        </p:nvSpPr>
+        <p:spPr>
+          <a:xfrm>
+            <a:off x="9127067" y="3539629"/>
+            <a:ext cx="1976567" cy="461665"/>
+          </a:xfrm>
+          <a:prstGeom prst="rect">
+            <a:avLst/>
+          </a:prstGeom>
+          <a:noFill/>
+        </p:spPr>
+        <p:txBody>
+          <a:bodyPr wrap="none" rtlCol="0">
+            <a:spAutoFit/>
+          </a:bodyPr>
+          <a:lstStyle/>
+          <a:p>
+            <a:r>
+              <a:rPr lang="de-DE" sz="2400" b="1" dirty="0" smtClean="0"/>
+              <a:t>Quell-Adresse</a:t>
+            </a:r>
+            <a:endParaRPr lang="de-DE" b="1" dirty="0"/>
+          </a:p>
+        </p:txBody>
+      </p:sp>
+      <p:cxnSp>
+        <p:nvCxnSpPr>
+          <p:cNvPr id="15" name="Gerade Verbindung mit Pfeil 14"/>
+          <p:cNvCxnSpPr/>
+          <p:nvPr/>
+        </p:nvCxnSpPr>
+        <p:spPr>
+          <a:xfrm flipH="1">
+            <a:off x="7814733" y="4001294"/>
+            <a:ext cx="1312334" cy="921376"/>
+          </a:xfrm>
+          <a:prstGeom prst="straightConnector1">
+            <a:avLst/>
+          </a:prstGeom>
+          <a:ln w="76200">
+            <a:solidFill>
+              <a:schemeClr val="accent1">
+                <a:lumMod val="60000"/>
+                <a:lumOff val="40000"/>
+              </a:schemeClr>
+            </a:solidFill>
+            <a:tailEnd type="triangle"/>
+          </a:ln>
+        </p:spPr>
+        <p:style>
+          <a:lnRef idx="1">
+            <a:schemeClr val="accent1"/>
+          </a:lnRef>
+          <a:fillRef idx="0">
+            <a:schemeClr val="accent1"/>
+          </a:fillRef>
+          <a:effectRef idx="0">
+            <a:schemeClr val="accent1"/>
+          </a:effectRef>
+          <a:fontRef idx="minor">
+            <a:schemeClr val="tx1"/>
+          </a:fontRef>
+        </p:style>
+      </p:cxnSp>
+      <p:sp>
+        <p:nvSpPr>
+          <p:cNvPr id="17" name="Textfeld 16"/>
+          <p:cNvSpPr txBox="1"/>
+          <p:nvPr/>
+        </p:nvSpPr>
+        <p:spPr>
+          <a:xfrm>
+            <a:off x="687785" y="5613934"/>
+            <a:ext cx="2679964" cy="461665"/>
+          </a:xfrm>
+          <a:prstGeom prst="rect">
+            <a:avLst/>
+          </a:prstGeom>
+          <a:noFill/>
+        </p:spPr>
+        <p:txBody>
+          <a:bodyPr wrap="none" rtlCol="0">
+            <a:spAutoFit/>
+          </a:bodyPr>
+          <a:lstStyle/>
+          <a:p>
+            <a:r>
+              <a:rPr lang="de-DE" sz="2400" b="1" dirty="0" smtClean="0"/>
+              <a:t>Versions-</a:t>
+            </a:r>
+            <a:r>
+              <a:rPr lang="de-DE" sz="2400" b="1" dirty="0" err="1" smtClean="0"/>
+              <a:t>Constraint</a:t>
+            </a:r>
+            <a:endParaRPr lang="de-DE" b="1" dirty="0"/>
+          </a:p>
+        </p:txBody>
+      </p:sp>
+      <p:sp>
+        <p:nvSpPr>
+          <p:cNvPr id="20" name="Textfeld 19"/>
+          <p:cNvSpPr txBox="1"/>
+          <p:nvPr/>
+        </p:nvSpPr>
+        <p:spPr>
+          <a:xfrm>
+            <a:off x="9275232" y="4064000"/>
+            <a:ext cx="2125134" cy="1200329"/>
+          </a:xfrm>
+          <a:prstGeom prst="rect">
+            <a:avLst/>
+          </a:prstGeom>
+          <a:noFill/>
+        </p:spPr>
+        <p:txBody>
+          <a:bodyPr wrap="square" rtlCol="0">
+            <a:spAutoFit/>
+          </a:bodyPr>
+          <a:lstStyle/>
+          <a:p>
+            <a:r>
+              <a:rPr lang="de-DE" dirty="0"/>
+              <a:t>Falls kein </a:t>
+            </a:r>
+            <a:r>
+              <a:rPr lang="de-DE" dirty="0" smtClean="0"/>
+              <a:t>Hostname explizit </a:t>
+            </a:r>
+            <a:r>
+              <a:rPr lang="de-DE" dirty="0"/>
+              <a:t>angegeben </a:t>
+            </a:r>
+            <a:r>
+              <a:rPr lang="de-DE" dirty="0" smtClean="0"/>
+              <a:t>wird per </a:t>
+            </a:r>
+            <a:r>
+              <a:rPr lang="de-DE" dirty="0" err="1" smtClean="0"/>
+              <a:t>default</a:t>
+            </a:r>
+            <a:endParaRPr lang="de-DE" dirty="0"/>
+          </a:p>
+          <a:p>
+            <a:r>
+              <a:rPr lang="de-DE" dirty="0"/>
+              <a:t>registry.terraform.io</a:t>
+            </a:r>
+            <a:endParaRPr lang="de-DE" dirty="0"/>
+          </a:p>
+        </p:txBody>
+      </p:sp>
+      <p:cxnSp>
+        <p:nvCxnSpPr>
+          <p:cNvPr id="21" name="Gerade Verbindung mit Pfeil 20"/>
+          <p:cNvCxnSpPr/>
+          <p:nvPr/>
+        </p:nvCxnSpPr>
+        <p:spPr>
+          <a:xfrm flipV="1">
+            <a:off x="3392737" y="5412440"/>
+            <a:ext cx="1865063" cy="318833"/>
+          </a:xfrm>
+          <a:prstGeom prst="straightConnector1">
+            <a:avLst/>
+          </a:prstGeom>
+          <a:ln w="76200">
+            <a:solidFill>
+              <a:schemeClr val="accent1">
+                <a:lumMod val="60000"/>
+                <a:lumOff val="40000"/>
+              </a:schemeClr>
+            </a:solidFill>
+            <a:tailEnd type="triangle"/>
+          </a:ln>
+        </p:spPr>
+        <p:style>
+          <a:lnRef idx="1">
+            <a:schemeClr val="accent1"/>
+          </a:lnRef>
+          <a:fillRef idx="0">
+            <a:schemeClr val="accent1"/>
+          </a:fillRef>
+          <a:effectRef idx="0">
+            <a:schemeClr val="accent1"/>
+          </a:effectRef>
+          <a:fontRef idx="minor">
+            <a:schemeClr val="tx1"/>
+          </a:fontRef>
+        </p:style>
+      </p:cxnSp>
+    </p:spTree>
+    <p:extLst>
+      <p:ext uri="{BB962C8B-B14F-4D97-AF65-F5344CB8AC3E}">
+        <p14:creationId xmlns:p14="http://schemas.microsoft.com/office/powerpoint/2010/main" val="3164792745"/>
+      </p:ext>
+    </p:extLst>
+  </p:cSld>
+  <p:clrMapOvr>
+    <a:masterClrMapping/>
+  </p:clrMapOvr>
+</p:sld>
+</file>
+
+<file path=ppt/slides/slide5.xml><?xml version="1.0" encoding="utf-8"?>
+<p:sld xmlns:a="http://schemas.openxmlformats.org/drawingml/2006/main" xmlns:r="http://schemas.openxmlformats.org/officeDocument/2006/relationships" xmlns:p="http://schemas.openxmlformats.org/presentationml/2006/main">
+  <p:cSld>
+    <p:spTree>
+      <p:nvGrpSpPr>
+        <p:cNvPr id="1" name=""/>
+        <p:cNvGrpSpPr/>
+        <p:nvPr/>
+      </p:nvGrpSpPr>
+      <p:grpSpPr>
+        <a:xfrm>
+          <a:off x="0" y="0"/>
+          <a:ext cx="0" cy="0"/>
+          <a:chOff x="0" y="0"/>
+          <a:chExt cx="0" cy="0"/>
+        </a:xfrm>
+      </p:grpSpPr>
+      <p:sp>
+        <p:nvSpPr>
+          <p:cNvPr id="2" name="Titel 1"/>
+          <p:cNvSpPr>
+            <a:spLocks noGrp="1"/>
+          </p:cNvSpPr>
+          <p:nvPr>
+            <p:ph type="title"/>
+          </p:nvPr>
+        </p:nvSpPr>
+        <p:spPr/>
+        <p:txBody>
+          <a:bodyPr/>
+          <a:lstStyle/>
+          <a:p>
+            <a:r>
+              <a:rPr lang="de-DE" dirty="0" smtClean="0"/>
+              <a:t>Provider </a:t>
+            </a:r>
+            <a:r>
+              <a:rPr lang="de-DE" dirty="0" err="1" smtClean="0"/>
+              <a:t>Configuration</a:t>
+            </a:r>
+            <a:endParaRPr lang="de-DE" dirty="0"/>
+          </a:p>
+        </p:txBody>
+      </p:sp>
+      <p:sp>
+        <p:nvSpPr>
+          <p:cNvPr id="3" name="Inhaltsplatzhalter 2"/>
+          <p:cNvSpPr>
+            <a:spLocks noGrp="1"/>
+          </p:cNvSpPr>
+          <p:nvPr>
+            <p:ph idx="1"/>
+          </p:nvPr>
+        </p:nvSpPr>
+        <p:spPr/>
+        <p:txBody>
+          <a:bodyPr/>
+          <a:lstStyle/>
+          <a:p>
+            <a:r>
+              <a:rPr lang="de-DE" dirty="0" smtClean="0"/>
+              <a:t>Manche Provider benötigen zusätzliche Konfiguration</a:t>
+            </a:r>
+          </a:p>
+          <a:p>
+            <a:pPr lvl="1"/>
+            <a:r>
+              <a:rPr lang="de-DE" dirty="0" smtClean="0"/>
+              <a:t>z.B. die Region des AWS-Accounts</a:t>
+            </a:r>
+          </a:p>
+          <a:p>
+            <a:pPr marL="0" indent="0">
+              <a:buNone/>
+            </a:pPr>
+            <a:endParaRPr lang="de-DE" dirty="0" smtClean="0"/>
+          </a:p>
+        </p:txBody>
+      </p:sp>
+      <p:sp>
+        <p:nvSpPr>
+          <p:cNvPr id="7" name="Textfeld 6"/>
+          <p:cNvSpPr txBox="1"/>
+          <p:nvPr/>
+        </p:nvSpPr>
+        <p:spPr>
+          <a:xfrm>
+            <a:off x="1422400" y="3204401"/>
+            <a:ext cx="3729482" cy="461665"/>
+          </a:xfrm>
+          <a:prstGeom prst="rect">
+            <a:avLst/>
+          </a:prstGeom>
+          <a:noFill/>
+        </p:spPr>
+        <p:txBody>
+          <a:bodyPr wrap="none" rtlCol="0">
+            <a:spAutoFit/>
+          </a:bodyPr>
+          <a:lstStyle/>
+          <a:p>
+            <a:r>
+              <a:rPr lang="de-DE" sz="2400" b="1" dirty="0" smtClean="0"/>
+              <a:t>Lokaler Name des Providers</a:t>
+            </a:r>
+            <a:endParaRPr lang="de-DE" b="1" dirty="0"/>
+          </a:p>
+        </p:txBody>
+      </p:sp>
+      <p:sp>
+        <p:nvSpPr>
+          <p:cNvPr id="11" name="Rectangle 4"/>
+          <p:cNvSpPr>
+            <a:spLocks noChangeArrowheads="1"/>
+          </p:cNvSpPr>
+          <p:nvPr/>
+        </p:nvSpPr>
+        <p:spPr bwMode="auto">
+          <a:xfrm>
+            <a:off x="4893733" y="3831960"/>
+            <a:ext cx="4055533" cy="2554545"/>
+          </a:xfrm>
+          <a:prstGeom prst="rect">
+            <a:avLst/>
+          </a:prstGeom>
+          <a:solidFill>
+            <a:srgbClr val="282C34"/>
+          </a:solidFill>
+          <a:ln>
+            <a:noFill/>
+          </a:ln>
+          <a:effectLst/>
+          <a:extLst>
+            <a:ext uri="{91240B29-F687-4F45-9708-019B960494DF}">
+              <a14:hiddenLine xmlns:a14="http://schemas.microsoft.com/office/drawing/2010/main" w="9525">
+                <a:solidFill>
+                  <a:schemeClr val="tx1"/>
+                </a:solidFill>
+                <a:miter lim="800000"/>
+                <a:headEnd/>
+                <a:tailEnd/>
+              </a14:hiddenLine>
+            </a:ext>
+            <a:ext uri="{AF507438-7753-43E0-B8FC-AC1667EBCBE1}">
+              <a14:hiddenEffects xmlns:a14="http://schemas.microsoft.com/office/drawing/2010/main">
+                <a:effectLst>
+                  <a:outerShdw dist="35921" dir="2700000" algn="ctr" rotWithShape="0">
+                    <a:schemeClr val="bg2"/>
+                  </a:outerShdw>
+                </a:effectLst>
+              </a14:hiddenEffects>
+            </a:ext>
+          </a:extLst>
+        </p:spPr>
+        <p:txBody>
+          <a:bodyPr vert="horz" wrap="square" lIns="91440" tIns="45720" rIns="91440" bIns="45720" numCol="1" anchor="ctr" anchorCtr="0" compatLnSpc="1">
+            <a:prstTxWarp prst="textNoShape">
+              <a:avLst/>
+            </a:prstTxWarp>
+            <a:spAutoFit/>
+          </a:bodyPr>
+          <a:lstStyle/>
+          <a:p>
+            <a:pPr marL="0" marR="0" lvl="0" indent="0" algn="l" defTabSz="914400" rtl="0" eaLnBrk="0" fontAlgn="base" latinLnBrk="0" hangingPunct="0">
+              <a:lnSpc>
+                <a:spcPct val="100000"/>
+              </a:lnSpc>
+              <a:spcBef>
+                <a:spcPct val="0"/>
+              </a:spcBef>
+              <a:spcAft>
+                <a:spcPct val="0"/>
+              </a:spcAft>
+              <a:buClrTx/>
+              <a:buSzTx/>
+              <a:buFontTx/>
+              <a:buNone/>
+              <a:tabLst/>
+            </a:pPr>
+            <a:r>
+              <a:rPr kumimoji="0" lang="de-DE" altLang="de-DE" sz="2000" b="0" i="1" u="none" strike="noStrike" cap="none" normalizeH="0" baseline="0" dirty="0" err="1" smtClean="0">
+                <a:ln>
+                  <a:noFill/>
+                </a:ln>
+                <a:solidFill>
+                  <a:srgbClr val="D55FDE"/>
+                </a:solidFill>
+                <a:effectLst/>
+                <a:latin typeface="JetBrains Mono"/>
+              </a:rPr>
+              <a:t>provider</a:t>
+            </a:r>
+            <a:r>
+              <a:rPr kumimoji="0" lang="de-DE" altLang="de-DE" sz="2000" b="0" i="1" u="none" strike="noStrike" cap="none" normalizeH="0" baseline="0" dirty="0" smtClean="0">
+                <a:ln>
+                  <a:noFill/>
+                </a:ln>
+                <a:solidFill>
+                  <a:srgbClr val="D55FDE"/>
+                </a:solidFill>
+                <a:effectLst/>
+                <a:latin typeface="JetBrains Mono"/>
+              </a:rPr>
+              <a:t> </a:t>
+            </a:r>
+            <a:r>
+              <a:rPr kumimoji="0" lang="de-DE" altLang="de-DE" sz="2000" b="0" i="0" u="none" strike="noStrike" cap="none" normalizeH="0" baseline="0" dirty="0" smtClean="0">
+                <a:ln>
+                  <a:noFill/>
+                </a:ln>
+                <a:solidFill>
+                  <a:srgbClr val="E5C07B"/>
+                </a:solidFill>
+                <a:effectLst/>
+                <a:latin typeface="JetBrains Mono"/>
+              </a:rPr>
+              <a:t>"</a:t>
+            </a:r>
+            <a:r>
+              <a:rPr kumimoji="0" lang="de-DE" altLang="de-DE" sz="2000" b="0" i="0" u="none" strike="noStrike" cap="none" normalizeH="0" baseline="0" dirty="0" err="1" smtClean="0">
+                <a:ln>
+                  <a:noFill/>
+                </a:ln>
+                <a:solidFill>
+                  <a:srgbClr val="E5C07B"/>
+                </a:solidFill>
+                <a:effectLst/>
+                <a:latin typeface="JetBrains Mono"/>
+              </a:rPr>
+              <a:t>aws</a:t>
+            </a:r>
+            <a:r>
+              <a:rPr kumimoji="0" lang="de-DE" altLang="de-DE" sz="2000" b="0" i="0" u="none" strike="noStrike" cap="none" normalizeH="0" baseline="0" dirty="0" smtClean="0">
+                <a:ln>
+                  <a:noFill/>
+                </a:ln>
+                <a:solidFill>
+                  <a:srgbClr val="E5C07B"/>
+                </a:solidFill>
+                <a:effectLst/>
+                <a:latin typeface="JetBrains Mono"/>
+              </a:rPr>
+              <a:t>" </a:t>
+            </a:r>
+            <a:r>
+              <a:rPr kumimoji="0" lang="de-DE" altLang="de-DE" sz="2000" b="0" i="0" u="none" strike="noStrike" cap="none" normalizeH="0" baseline="0" dirty="0" smtClean="0">
+                <a:ln>
+                  <a:noFill/>
+                </a:ln>
+                <a:solidFill>
+                  <a:srgbClr val="BBBBBB"/>
+                </a:solidFill>
+                <a:effectLst/>
+                <a:latin typeface="JetBrains Mono"/>
+              </a:rPr>
+              <a:t>{</a:t>
+            </a:r>
+            <a:br>
+              <a:rPr kumimoji="0" lang="de-DE" altLang="de-DE" sz="2000" b="0" i="0" u="none" strike="noStrike" cap="none" normalizeH="0" baseline="0" dirty="0" smtClean="0">
+                <a:ln>
+                  <a:noFill/>
+                </a:ln>
+                <a:solidFill>
+                  <a:srgbClr val="BBBBBB"/>
+                </a:solidFill>
+                <a:effectLst/>
+                <a:latin typeface="JetBrains Mono"/>
+              </a:rPr>
+            </a:br>
+            <a:r>
+              <a:rPr kumimoji="0" lang="de-DE" altLang="de-DE" sz="2000" b="0" i="0" u="none" strike="noStrike" cap="none" normalizeH="0" baseline="0" dirty="0" smtClean="0">
+                <a:ln>
+                  <a:noFill/>
+                </a:ln>
+                <a:solidFill>
+                  <a:srgbClr val="BBBBBB"/>
+                </a:solidFill>
+                <a:effectLst/>
+                <a:latin typeface="JetBrains Mono"/>
+              </a:rPr>
+              <a:t>  </a:t>
+            </a:r>
+            <a:r>
+              <a:rPr kumimoji="0" lang="de-DE" altLang="de-DE" sz="2000" b="0" i="0" u="none" strike="noStrike" cap="none" normalizeH="0" baseline="0" dirty="0" err="1" smtClean="0">
+                <a:ln>
+                  <a:noFill/>
+                </a:ln>
+                <a:solidFill>
+                  <a:srgbClr val="EF596F"/>
+                </a:solidFill>
+                <a:effectLst/>
+                <a:latin typeface="JetBrains Mono"/>
+              </a:rPr>
+              <a:t>region</a:t>
+            </a:r>
+            <a:r>
+              <a:rPr kumimoji="0" lang="de-DE" altLang="de-DE" sz="2000" b="0" i="0" u="none" strike="noStrike" cap="none" normalizeH="0" baseline="0" dirty="0" smtClean="0">
+                <a:ln>
+                  <a:noFill/>
+                </a:ln>
+                <a:solidFill>
+                  <a:srgbClr val="BBBBBB"/>
+                </a:solidFill>
+                <a:effectLst/>
+                <a:latin typeface="JetBrains Mono"/>
+              </a:rPr>
+              <a:t>=</a:t>
+            </a:r>
+            <a:r>
+              <a:rPr kumimoji="0" lang="de-DE" altLang="de-DE" sz="2000" b="0" i="0" u="none" strike="noStrike" cap="none" normalizeH="0" baseline="0" dirty="0" smtClean="0">
+                <a:ln>
+                  <a:noFill/>
+                </a:ln>
+                <a:solidFill>
+                  <a:srgbClr val="89CA78"/>
+                </a:solidFill>
+                <a:effectLst/>
+                <a:latin typeface="JetBrains Mono"/>
+              </a:rPr>
+              <a:t>"us-east-1"</a:t>
+            </a:r>
+            <a:br>
+              <a:rPr kumimoji="0" lang="de-DE" altLang="de-DE" sz="2000" b="0" i="0" u="none" strike="noStrike" cap="none" normalizeH="0" baseline="0" dirty="0" smtClean="0">
+                <a:ln>
+                  <a:noFill/>
+                </a:ln>
+                <a:solidFill>
+                  <a:srgbClr val="89CA78"/>
+                </a:solidFill>
+                <a:effectLst/>
+                <a:latin typeface="JetBrains Mono"/>
+              </a:rPr>
+            </a:br>
+            <a:r>
+              <a:rPr kumimoji="0" lang="de-DE" altLang="de-DE" sz="2000" b="0" i="0" u="none" strike="noStrike" cap="none" normalizeH="0" baseline="0" dirty="0" smtClean="0">
+                <a:ln>
+                  <a:noFill/>
+                </a:ln>
+                <a:solidFill>
+                  <a:srgbClr val="BBBBBB"/>
+                </a:solidFill>
+                <a:effectLst/>
+                <a:latin typeface="JetBrains Mono"/>
+              </a:rPr>
+              <a:t>}</a:t>
+            </a:r>
+            <a:br>
+              <a:rPr kumimoji="0" lang="de-DE" altLang="de-DE" sz="2000" b="0" i="0" u="none" strike="noStrike" cap="none" normalizeH="0" baseline="0" dirty="0" smtClean="0">
+                <a:ln>
+                  <a:noFill/>
+                </a:ln>
+                <a:solidFill>
+                  <a:srgbClr val="BBBBBB"/>
+                </a:solidFill>
+                <a:effectLst/>
+                <a:latin typeface="JetBrains Mono"/>
+              </a:rPr>
+            </a:br>
+            <a:r>
+              <a:rPr kumimoji="0" lang="de-DE" altLang="de-DE" sz="2000" b="0" i="0" u="none" strike="noStrike" cap="none" normalizeH="0" baseline="0" dirty="0" smtClean="0">
+                <a:ln>
+                  <a:noFill/>
+                </a:ln>
+                <a:solidFill>
+                  <a:srgbClr val="BBBBBB"/>
+                </a:solidFill>
+                <a:effectLst/>
+                <a:latin typeface="JetBrains Mono"/>
+              </a:rPr>
+              <a:t/>
+            </a:r>
+            <a:br>
+              <a:rPr kumimoji="0" lang="de-DE" altLang="de-DE" sz="2000" b="0" i="0" u="none" strike="noStrike" cap="none" normalizeH="0" baseline="0" dirty="0" smtClean="0">
+                <a:ln>
+                  <a:noFill/>
+                </a:ln>
+                <a:solidFill>
+                  <a:srgbClr val="BBBBBB"/>
+                </a:solidFill>
+                <a:effectLst/>
+                <a:latin typeface="JetBrains Mono"/>
+              </a:rPr>
+            </a:br>
+            <a:r>
+              <a:rPr kumimoji="0" lang="de-DE" altLang="de-DE" sz="2000" b="0" i="1" u="none" strike="noStrike" cap="none" normalizeH="0" baseline="0" dirty="0" err="1" smtClean="0">
+                <a:ln>
+                  <a:noFill/>
+                </a:ln>
+                <a:solidFill>
+                  <a:srgbClr val="D55FDE"/>
+                </a:solidFill>
+                <a:effectLst/>
+                <a:latin typeface="JetBrains Mono"/>
+              </a:rPr>
+              <a:t>provider</a:t>
+            </a:r>
+            <a:r>
+              <a:rPr kumimoji="0" lang="de-DE" altLang="de-DE" sz="2000" b="0" i="1" u="none" strike="noStrike" cap="none" normalizeH="0" baseline="0" dirty="0" smtClean="0">
+                <a:ln>
+                  <a:noFill/>
+                </a:ln>
+                <a:solidFill>
+                  <a:srgbClr val="D55FDE"/>
+                </a:solidFill>
+                <a:effectLst/>
+                <a:latin typeface="JetBrains Mono"/>
+              </a:rPr>
+              <a:t> </a:t>
+            </a:r>
+            <a:r>
+              <a:rPr kumimoji="0" lang="de-DE" altLang="de-DE" sz="2000" b="0" i="0" u="none" strike="noStrike" cap="none" normalizeH="0" baseline="0" dirty="0" smtClean="0">
+                <a:ln>
+                  <a:noFill/>
+                </a:ln>
+                <a:solidFill>
+                  <a:srgbClr val="E5C07B"/>
+                </a:solidFill>
+                <a:effectLst/>
+                <a:latin typeface="JetBrains Mono"/>
+              </a:rPr>
+              <a:t>"</a:t>
+            </a:r>
+            <a:r>
+              <a:rPr kumimoji="0" lang="de-DE" altLang="de-DE" sz="2000" b="0" i="0" u="none" strike="noStrike" cap="none" normalizeH="0" baseline="0" dirty="0" err="1" smtClean="0">
+                <a:ln>
+                  <a:noFill/>
+                </a:ln>
+                <a:solidFill>
+                  <a:srgbClr val="E5C07B"/>
+                </a:solidFill>
+                <a:effectLst/>
+                <a:latin typeface="JetBrains Mono"/>
+              </a:rPr>
+              <a:t>aws</a:t>
+            </a:r>
+            <a:r>
+              <a:rPr kumimoji="0" lang="de-DE" altLang="de-DE" sz="2000" b="0" i="0" u="none" strike="noStrike" cap="none" normalizeH="0" baseline="0" dirty="0" smtClean="0">
+                <a:ln>
+                  <a:noFill/>
+                </a:ln>
+                <a:solidFill>
+                  <a:srgbClr val="E5C07B"/>
+                </a:solidFill>
+                <a:effectLst/>
+                <a:latin typeface="JetBrains Mono"/>
+              </a:rPr>
+              <a:t>" </a:t>
+            </a:r>
+            <a:r>
+              <a:rPr kumimoji="0" lang="de-DE" altLang="de-DE" sz="2000" b="0" i="0" u="none" strike="noStrike" cap="none" normalizeH="0" baseline="0" dirty="0" smtClean="0">
+                <a:ln>
+                  <a:noFill/>
+                </a:ln>
+                <a:solidFill>
+                  <a:srgbClr val="BBBBBB"/>
+                </a:solidFill>
+                <a:effectLst/>
+                <a:latin typeface="JetBrains Mono"/>
+              </a:rPr>
+              <a:t>{</a:t>
+            </a:r>
+            <a:br>
+              <a:rPr kumimoji="0" lang="de-DE" altLang="de-DE" sz="2000" b="0" i="0" u="none" strike="noStrike" cap="none" normalizeH="0" baseline="0" dirty="0" smtClean="0">
+                <a:ln>
+                  <a:noFill/>
+                </a:ln>
+                <a:solidFill>
+                  <a:srgbClr val="BBBBBB"/>
+                </a:solidFill>
+                <a:effectLst/>
+                <a:latin typeface="JetBrains Mono"/>
+              </a:rPr>
+            </a:br>
+            <a:r>
+              <a:rPr kumimoji="0" lang="de-DE" altLang="de-DE" sz="2000" b="0" i="0" u="none" strike="noStrike" cap="none" normalizeH="0" baseline="0" dirty="0" smtClean="0">
+                <a:ln>
+                  <a:noFill/>
+                </a:ln>
+                <a:solidFill>
+                  <a:srgbClr val="BBBBBB"/>
+                </a:solidFill>
+                <a:effectLst/>
+                <a:latin typeface="JetBrains Mono"/>
+              </a:rPr>
+              <a:t>  </a:t>
+            </a:r>
+            <a:r>
+              <a:rPr kumimoji="0" lang="de-DE" altLang="de-DE" sz="2000" b="0" i="0" u="none" strike="noStrike" cap="none" normalizeH="0" baseline="0" dirty="0" err="1" smtClean="0">
+                <a:ln>
+                  <a:noFill/>
+                </a:ln>
+                <a:solidFill>
+                  <a:srgbClr val="EF596F"/>
+                </a:solidFill>
+                <a:effectLst/>
+                <a:latin typeface="JetBrains Mono"/>
+              </a:rPr>
+              <a:t>region</a:t>
+            </a:r>
+            <a:r>
+              <a:rPr kumimoji="0" lang="de-DE" altLang="de-DE" sz="2000" b="0" i="0" u="none" strike="noStrike" cap="none" normalizeH="0" baseline="0" dirty="0" smtClean="0">
+                <a:ln>
+                  <a:noFill/>
+                </a:ln>
+                <a:solidFill>
+                  <a:srgbClr val="BBBBBB"/>
+                </a:solidFill>
+                <a:effectLst/>
+                <a:latin typeface="JetBrains Mono"/>
+              </a:rPr>
+              <a:t>=</a:t>
+            </a:r>
+            <a:r>
+              <a:rPr kumimoji="0" lang="de-DE" altLang="de-DE" sz="2000" b="0" i="0" u="none" strike="noStrike" cap="none" normalizeH="0" baseline="0" dirty="0" smtClean="0">
+                <a:ln>
+                  <a:noFill/>
+                </a:ln>
+                <a:solidFill>
+                  <a:srgbClr val="89CA78"/>
+                </a:solidFill>
+                <a:effectLst/>
+                <a:latin typeface="JetBrains Mono"/>
+              </a:rPr>
+              <a:t>"eu-central-1"</a:t>
+            </a:r>
+            <a:br>
+              <a:rPr kumimoji="0" lang="de-DE" altLang="de-DE" sz="2000" b="0" i="0" u="none" strike="noStrike" cap="none" normalizeH="0" baseline="0" dirty="0" smtClean="0">
+                <a:ln>
+                  <a:noFill/>
+                </a:ln>
+                <a:solidFill>
+                  <a:srgbClr val="89CA78"/>
+                </a:solidFill>
+                <a:effectLst/>
+                <a:latin typeface="JetBrains Mono"/>
+              </a:rPr>
+            </a:br>
+            <a:r>
+              <a:rPr kumimoji="0" lang="de-DE" altLang="de-DE" sz="2000" b="0" i="0" u="none" strike="noStrike" cap="none" normalizeH="0" baseline="0" dirty="0" smtClean="0">
+                <a:ln>
+                  <a:noFill/>
+                </a:ln>
+                <a:solidFill>
+                  <a:srgbClr val="89CA78"/>
+                </a:solidFill>
+                <a:effectLst/>
+                <a:latin typeface="JetBrains Mono"/>
+              </a:rPr>
+              <a:t>  </a:t>
+            </a:r>
+            <a:r>
+              <a:rPr kumimoji="0" lang="de-DE" altLang="de-DE" sz="2000" b="0" i="0" u="none" strike="noStrike" cap="none" normalizeH="0" baseline="0" dirty="0" smtClean="0">
+                <a:ln>
+                  <a:noFill/>
+                </a:ln>
+                <a:solidFill>
+                  <a:srgbClr val="EF596F"/>
+                </a:solidFill>
+                <a:effectLst/>
+                <a:latin typeface="JetBrains Mono"/>
+              </a:rPr>
+              <a:t>alias </a:t>
+            </a:r>
+            <a:r>
+              <a:rPr kumimoji="0" lang="de-DE" altLang="de-DE" sz="2000" b="0" i="0" u="none" strike="noStrike" cap="none" normalizeH="0" baseline="0" dirty="0" smtClean="0">
+                <a:ln>
+                  <a:noFill/>
+                </a:ln>
+                <a:solidFill>
+                  <a:srgbClr val="BBBBBB"/>
+                </a:solidFill>
+                <a:effectLst/>
+                <a:latin typeface="JetBrains Mono"/>
+              </a:rPr>
+              <a:t>= </a:t>
+            </a:r>
+            <a:r>
+              <a:rPr kumimoji="0" lang="de-DE" altLang="de-DE" sz="2000" b="0" i="0" u="none" strike="noStrike" cap="none" normalizeH="0" baseline="0" dirty="0" smtClean="0">
+                <a:ln>
+                  <a:noFill/>
+                </a:ln>
+                <a:solidFill>
+                  <a:srgbClr val="89CA78"/>
+                </a:solidFill>
+                <a:effectLst/>
+                <a:latin typeface="JetBrains Mono"/>
+              </a:rPr>
+              <a:t>"</a:t>
+            </a:r>
+            <a:r>
+              <a:rPr kumimoji="0" lang="de-DE" altLang="de-DE" sz="2000" b="0" i="0" u="none" strike="noStrike" cap="none" normalizeH="0" baseline="0" dirty="0" err="1" smtClean="0">
+                <a:ln>
+                  <a:noFill/>
+                </a:ln>
+                <a:solidFill>
+                  <a:srgbClr val="89CA78"/>
+                </a:solidFill>
+                <a:effectLst/>
+                <a:latin typeface="JetBrains Mono"/>
+              </a:rPr>
+              <a:t>eu</a:t>
+            </a:r>
+            <a:r>
+              <a:rPr kumimoji="0" lang="de-DE" altLang="de-DE" sz="2000" b="0" i="0" u="none" strike="noStrike" cap="none" normalizeH="0" baseline="0" dirty="0" smtClean="0">
+                <a:ln>
+                  <a:noFill/>
+                </a:ln>
+                <a:solidFill>
+                  <a:srgbClr val="89CA78"/>
+                </a:solidFill>
+                <a:effectLst/>
+                <a:latin typeface="JetBrains Mono"/>
+              </a:rPr>
+              <a:t>"</a:t>
+            </a:r>
+            <a:br>
+              <a:rPr kumimoji="0" lang="de-DE" altLang="de-DE" sz="2000" b="0" i="0" u="none" strike="noStrike" cap="none" normalizeH="0" baseline="0" dirty="0" smtClean="0">
+                <a:ln>
+                  <a:noFill/>
+                </a:ln>
+                <a:solidFill>
+                  <a:srgbClr val="89CA78"/>
+                </a:solidFill>
+                <a:effectLst/>
+                <a:latin typeface="JetBrains Mono"/>
+              </a:rPr>
+            </a:br>
+            <a:r>
+              <a:rPr kumimoji="0" lang="de-DE" altLang="de-DE" sz="2000" b="0" i="0" u="none" strike="noStrike" cap="none" normalizeH="0" baseline="0" dirty="0" smtClean="0">
+                <a:ln>
+                  <a:noFill/>
+                </a:ln>
+                <a:solidFill>
+                  <a:srgbClr val="BBBBBB"/>
+                </a:solidFill>
+                <a:effectLst/>
+                <a:latin typeface="JetBrains Mono"/>
+              </a:rPr>
+              <a:t>}</a:t>
+            </a:r>
+            <a:endParaRPr kumimoji="0" lang="de-DE" altLang="de-DE" sz="2000" b="0" i="0" u="none" strike="noStrike" cap="none" normalizeH="0" baseline="0" dirty="0" smtClean="0">
+              <a:ln>
+                <a:noFill/>
+              </a:ln>
+              <a:solidFill>
+                <a:schemeClr val="tx1"/>
+              </a:solidFill>
+              <a:effectLst/>
+              <a:latin typeface="Arial" panose="020B0604020202020204" pitchFamily="34" charset="0"/>
+            </a:endParaRPr>
+          </a:p>
+        </p:txBody>
+      </p:sp>
+      <p:cxnSp>
+        <p:nvCxnSpPr>
+          <p:cNvPr id="8" name="Gerade Verbindung mit Pfeil 7"/>
+          <p:cNvCxnSpPr/>
+          <p:nvPr/>
+        </p:nvCxnSpPr>
+        <p:spPr>
+          <a:xfrm>
+            <a:off x="5215467" y="3420533"/>
+            <a:ext cx="1024466" cy="491067"/>
+          </a:xfrm>
+          <a:prstGeom prst="straightConnector1">
+            <a:avLst/>
+          </a:prstGeom>
+          <a:ln w="76200">
+            <a:solidFill>
+              <a:schemeClr val="accent1">
+                <a:lumMod val="60000"/>
+                <a:lumOff val="40000"/>
+              </a:schemeClr>
+            </a:solidFill>
+            <a:tailEnd type="triangle"/>
+          </a:ln>
+        </p:spPr>
+        <p:style>
+          <a:lnRef idx="1">
+            <a:schemeClr val="accent1"/>
+          </a:lnRef>
+          <a:fillRef idx="0">
+            <a:schemeClr val="accent1"/>
+          </a:fillRef>
+          <a:effectRef idx="0">
+            <a:schemeClr val="accent1"/>
+          </a:effectRef>
+          <a:fontRef idx="minor">
+            <a:schemeClr val="tx1"/>
+          </a:fontRef>
+        </p:style>
+      </p:cxnSp>
+      <p:sp>
+        <p:nvSpPr>
+          <p:cNvPr id="17" name="Textfeld 16"/>
+          <p:cNvSpPr txBox="1"/>
+          <p:nvPr/>
+        </p:nvSpPr>
+        <p:spPr>
+          <a:xfrm>
+            <a:off x="1871134" y="4468802"/>
+            <a:ext cx="797013" cy="461665"/>
+          </a:xfrm>
+          <a:prstGeom prst="rect">
+            <a:avLst/>
+          </a:prstGeom>
+          <a:noFill/>
+        </p:spPr>
+        <p:txBody>
+          <a:bodyPr wrap="none" rtlCol="0">
+            <a:spAutoFit/>
+          </a:bodyPr>
+          <a:lstStyle/>
+          <a:p>
+            <a:r>
+              <a:rPr lang="de-DE" sz="2400" b="1" dirty="0" smtClean="0"/>
+              <a:t>Alias</a:t>
+            </a:r>
+            <a:endParaRPr lang="de-DE" b="1" dirty="0"/>
+          </a:p>
+        </p:txBody>
+      </p:sp>
+      <p:cxnSp>
+        <p:nvCxnSpPr>
+          <p:cNvPr id="18" name="Gerade Verbindung mit Pfeil 17"/>
+          <p:cNvCxnSpPr/>
+          <p:nvPr/>
+        </p:nvCxnSpPr>
+        <p:spPr>
+          <a:xfrm>
+            <a:off x="2768600" y="4819168"/>
+            <a:ext cx="2125133" cy="980499"/>
+          </a:xfrm>
+          <a:prstGeom prst="straightConnector1">
+            <a:avLst/>
+          </a:prstGeom>
+          <a:ln w="76200">
+            <a:solidFill>
+              <a:schemeClr val="accent1">
+                <a:lumMod val="60000"/>
+                <a:lumOff val="40000"/>
+              </a:schemeClr>
+            </a:solidFill>
+            <a:tailEnd type="triangle"/>
+          </a:ln>
+        </p:spPr>
+        <p:style>
+          <a:lnRef idx="1">
+            <a:schemeClr val="accent1"/>
+          </a:lnRef>
+          <a:fillRef idx="0">
+            <a:schemeClr val="accent1"/>
+          </a:fillRef>
+          <a:effectRef idx="0">
+            <a:schemeClr val="accent1"/>
+          </a:effectRef>
+          <a:fontRef idx="minor">
+            <a:schemeClr val="tx1"/>
+          </a:fontRef>
+        </p:style>
+      </p:cxnSp>
+      <p:sp>
+        <p:nvSpPr>
+          <p:cNvPr id="20" name="Textfeld 19"/>
+          <p:cNvSpPr txBox="1"/>
+          <p:nvPr/>
+        </p:nvSpPr>
+        <p:spPr>
+          <a:xfrm>
+            <a:off x="1897679" y="4930467"/>
+            <a:ext cx="1837267" cy="1477328"/>
+          </a:xfrm>
+          <a:prstGeom prst="rect">
+            <a:avLst/>
+          </a:prstGeom>
+          <a:noFill/>
+        </p:spPr>
+        <p:txBody>
+          <a:bodyPr wrap="square" rtlCol="0">
+            <a:spAutoFit/>
+          </a:bodyPr>
+          <a:lstStyle/>
+          <a:p>
+            <a:r>
+              <a:rPr lang="de-DE" dirty="0" smtClean="0"/>
+              <a:t>Angabe notwendig bei mehreren Konfigurationen des Providers</a:t>
+            </a:r>
+          </a:p>
+        </p:txBody>
+      </p:sp>
+    </p:spTree>
+    <p:extLst>
+      <p:ext uri="{BB962C8B-B14F-4D97-AF65-F5344CB8AC3E}">
+        <p14:creationId xmlns:p14="http://schemas.microsoft.com/office/powerpoint/2010/main" val="796605831"/>
+      </p:ext>
+    </p:extLst>
+  </p:cSld>
+  <p:clrMapOvr>
+    <a:masterClrMapping/>
+  </p:clrMapOvr>
 </p:sld>
 </file>
 

</xml_diff>